<commit_message>
Implementing Jason's and Tyler's changes
</commit_message>
<xml_diff>
--- a/SongSuggest.pptx
+++ b/SongSuggest.pptx
@@ -114,13 +114,18 @@
       </a:defRPr>
     </a:lvl9pPr>
   </p:defaultTextStyle>
+  <p:extLst>
+    <p:ext uri="{EFAFB233-063F-42B5-8137-9DF3F51BA10A}">
+      <p15:sldGuideLst xmlns:p15="http://schemas.microsoft.com/office/powerpoint/2012/main"/>
+    </p:ext>
+  </p:extLst>
 </p:presentation>
 </file>
 
 <file path=ppt/revisionInfo.xml><?xml version="1.0" encoding="utf-8"?>
 <p1510:revInfo xmlns:a="http://schemas.openxmlformats.org/drawingml/2006/main" xmlns:r="http://schemas.openxmlformats.org/officeDocument/2006/relationships" xmlns:p1510="http://schemas.microsoft.com/office/powerpoint/2015/10/main">
   <p1510:revLst>
-    <p1510:client id="{EC85A1E6-63CE-4D13-8D7C-140007227A38}" v="9" dt="2023-12-02T19:59:02.231"/>
+    <p1510:client id="{583A3799-5026-4E63-B11A-CF426DF41DA8}" v="3" dt="2023-12-10T17:25:01.246"/>
   </p1510:revLst>
 </p1510:revInfo>
 </file>
@@ -381,6 +386,123 @@
       </pc:sldChg>
     </pc:docChg>
   </pc:docChgLst>
+  <pc:docChgLst>
+    <pc:chgData name="Vukovic, Amar" userId="ce482621-b965-46c3-9f88-db809a689d29" providerId="ADAL" clId="{583A3799-5026-4E63-B11A-CF426DF41DA8}"/>
+    <pc:docChg chg="undo custSel modSld">
+      <pc:chgData name="Vukovic, Amar" userId="ce482621-b965-46c3-9f88-db809a689d29" providerId="ADAL" clId="{583A3799-5026-4E63-B11A-CF426DF41DA8}" dt="2023-12-10T17:33:31.914" v="575" actId="20577"/>
+      <pc:docMkLst>
+        <pc:docMk/>
+      </pc:docMkLst>
+      <pc:sldChg chg="modSp mod">
+        <pc:chgData name="Vukovic, Amar" userId="ce482621-b965-46c3-9f88-db809a689d29" providerId="ADAL" clId="{583A3799-5026-4E63-B11A-CF426DF41DA8}" dt="2023-12-10T17:28:55.127" v="415" actId="20577"/>
+        <pc:sldMkLst>
+          <pc:docMk/>
+          <pc:sldMk cId="736030002" sldId="257"/>
+        </pc:sldMkLst>
+        <pc:spChg chg="mod">
+          <ac:chgData name="Vukovic, Amar" userId="ce482621-b965-46c3-9f88-db809a689d29" providerId="ADAL" clId="{583A3799-5026-4E63-B11A-CF426DF41DA8}" dt="2023-12-10T17:28:55.127" v="415" actId="20577"/>
+          <ac:spMkLst>
+            <pc:docMk/>
+            <pc:sldMk cId="736030002" sldId="257"/>
+            <ac:spMk id="3" creationId="{DF1B4F32-4EAB-4298-BF3A-D7F935089BF5}"/>
+          </ac:spMkLst>
+        </pc:spChg>
+      </pc:sldChg>
+      <pc:sldChg chg="addSp delSp modSp mod">
+        <pc:chgData name="Vukovic, Amar" userId="ce482621-b965-46c3-9f88-db809a689d29" providerId="ADAL" clId="{583A3799-5026-4E63-B11A-CF426DF41DA8}" dt="2023-12-10T17:28:41.091" v="409" actId="20577"/>
+        <pc:sldMkLst>
+          <pc:docMk/>
+          <pc:sldMk cId="3043180318" sldId="258"/>
+        </pc:sldMkLst>
+        <pc:spChg chg="mod">
+          <ac:chgData name="Vukovic, Amar" userId="ce482621-b965-46c3-9f88-db809a689d29" providerId="ADAL" clId="{583A3799-5026-4E63-B11A-CF426DF41DA8}" dt="2023-12-10T17:28:41.091" v="409" actId="20577"/>
+          <ac:spMkLst>
+            <pc:docMk/>
+            <pc:sldMk cId="3043180318" sldId="258"/>
+            <ac:spMk id="3" creationId="{47ED5A3B-77E9-EA4F-6811-EBB026AAD82D}"/>
+          </ac:spMkLst>
+        </pc:spChg>
+        <pc:spChg chg="add del">
+          <ac:chgData name="Vukovic, Amar" userId="ce482621-b965-46c3-9f88-db809a689d29" providerId="ADAL" clId="{583A3799-5026-4E63-B11A-CF426DF41DA8}" dt="2023-12-10T17:21:41.100" v="1" actId="22"/>
+          <ac:spMkLst>
+            <pc:docMk/>
+            <pc:sldMk cId="3043180318" sldId="258"/>
+            <ac:spMk id="5" creationId="{25B43C04-E51A-75E0-EAB2-5EE538CC37C1}"/>
+          </ac:spMkLst>
+        </pc:spChg>
+        <pc:spChg chg="add del">
+          <ac:chgData name="Vukovic, Amar" userId="ce482621-b965-46c3-9f88-db809a689d29" providerId="ADAL" clId="{583A3799-5026-4E63-B11A-CF426DF41DA8}" dt="2023-12-10T17:22:07.947" v="3" actId="22"/>
+          <ac:spMkLst>
+            <pc:docMk/>
+            <pc:sldMk cId="3043180318" sldId="258"/>
+            <ac:spMk id="7" creationId="{8CDB8FD9-5B0E-C295-5030-C66388B47216}"/>
+          </ac:spMkLst>
+        </pc:spChg>
+        <pc:spChg chg="add mod">
+          <ac:chgData name="Vukovic, Amar" userId="ce482621-b965-46c3-9f88-db809a689d29" providerId="ADAL" clId="{583A3799-5026-4E63-B11A-CF426DF41DA8}" dt="2023-12-10T17:25:22.512" v="135" actId="1035"/>
+          <ac:spMkLst>
+            <pc:docMk/>
+            <pc:sldMk cId="3043180318" sldId="258"/>
+            <ac:spMk id="11" creationId="{26648825-6DDE-9118-37F9-360CF5EFC203}"/>
+          </ac:spMkLst>
+        </pc:spChg>
+        <pc:spChg chg="add mod">
+          <ac:chgData name="Vukovic, Amar" userId="ce482621-b965-46c3-9f88-db809a689d29" providerId="ADAL" clId="{583A3799-5026-4E63-B11A-CF426DF41DA8}" dt="2023-12-10T17:25:22.512" v="135" actId="1035"/>
+          <ac:spMkLst>
+            <pc:docMk/>
+            <pc:sldMk cId="3043180318" sldId="258"/>
+            <ac:spMk id="12" creationId="{8EDCDE07-DBE2-4B70-29FC-3465746923DB}"/>
+          </ac:spMkLst>
+        </pc:spChg>
+        <pc:spChg chg="add mod">
+          <ac:chgData name="Vukovic, Amar" userId="ce482621-b965-46c3-9f88-db809a689d29" providerId="ADAL" clId="{583A3799-5026-4E63-B11A-CF426DF41DA8}" dt="2023-12-10T17:25:22.512" v="135" actId="1035"/>
+          <ac:spMkLst>
+            <pc:docMk/>
+            <pc:sldMk cId="3043180318" sldId="258"/>
+            <ac:spMk id="13" creationId="{3DD2B3FB-76FB-218E-17C3-71CBC3214DDE}"/>
+          </ac:spMkLst>
+        </pc:spChg>
+        <pc:picChg chg="add mod">
+          <ac:chgData name="Vukovic, Amar" userId="ce482621-b965-46c3-9f88-db809a689d29" providerId="ADAL" clId="{583A3799-5026-4E63-B11A-CF426DF41DA8}" dt="2023-12-10T17:25:22.512" v="135" actId="1035"/>
+          <ac:picMkLst>
+            <pc:docMk/>
+            <pc:sldMk cId="3043180318" sldId="258"/>
+            <ac:picMk id="9" creationId="{49CCB90E-F81E-BC2A-77E9-4DCE8560A64C}"/>
+          </ac:picMkLst>
+        </pc:picChg>
+      </pc:sldChg>
+      <pc:sldChg chg="modSp mod">
+        <pc:chgData name="Vukovic, Amar" userId="ce482621-b965-46c3-9f88-db809a689d29" providerId="ADAL" clId="{583A3799-5026-4E63-B11A-CF426DF41DA8}" dt="2023-12-10T17:33:31.914" v="575" actId="20577"/>
+        <pc:sldMkLst>
+          <pc:docMk/>
+          <pc:sldMk cId="3164650218" sldId="259"/>
+        </pc:sldMkLst>
+        <pc:spChg chg="mod">
+          <ac:chgData name="Vukovic, Amar" userId="ce482621-b965-46c3-9f88-db809a689d29" providerId="ADAL" clId="{583A3799-5026-4E63-B11A-CF426DF41DA8}" dt="2023-12-10T17:33:31.914" v="575" actId="20577"/>
+          <ac:spMkLst>
+            <pc:docMk/>
+            <pc:sldMk cId="3164650218" sldId="259"/>
+            <ac:spMk id="3" creationId="{0526474C-B278-7BD0-DA99-052E71244BCA}"/>
+          </ac:spMkLst>
+        </pc:spChg>
+      </pc:sldChg>
+      <pc:sldChg chg="modSp mod">
+        <pc:chgData name="Vukovic, Amar" userId="ce482621-b965-46c3-9f88-db809a689d29" providerId="ADAL" clId="{583A3799-5026-4E63-B11A-CF426DF41DA8}" dt="2023-12-10T17:31:01.507" v="574" actId="20577"/>
+        <pc:sldMkLst>
+          <pc:docMk/>
+          <pc:sldMk cId="178626268" sldId="262"/>
+        </pc:sldMkLst>
+        <pc:spChg chg="mod">
+          <ac:chgData name="Vukovic, Amar" userId="ce482621-b965-46c3-9f88-db809a689d29" providerId="ADAL" clId="{583A3799-5026-4E63-B11A-CF426DF41DA8}" dt="2023-12-10T17:31:01.507" v="574" actId="20577"/>
+          <ac:spMkLst>
+            <pc:docMk/>
+            <pc:sldMk cId="178626268" sldId="262"/>
+            <ac:spMk id="3" creationId="{0526474C-B278-7BD0-DA99-052E71244BCA}"/>
+          </ac:spMkLst>
+        </pc:spChg>
+      </pc:sldChg>
+    </pc:docChg>
+  </pc:docChgLst>
 </pc:chgInfo>
 </file>
 
@@ -523,7 +645,7 @@
           <a:p>
             <a:fld id="{14B70C5D-AD85-429F-99C4-8080320123EE}" type="datetimeFigureOut">
               <a:rPr lang="en-US" smtClean="0"/>
-              <a:t>12/2/2023</a:t>
+              <a:t>12/10/2023</a:t>
             </a:fld>
             <a:endParaRPr lang="en-US"/>
           </a:p>
@@ -734,7 +856,7 @@
           <a:p>
             <a:fld id="{14B70C5D-AD85-429F-99C4-8080320123EE}" type="datetimeFigureOut">
               <a:rPr lang="en-US" smtClean="0"/>
-              <a:t>12/2/2023</a:t>
+              <a:t>12/10/2023</a:t>
             </a:fld>
             <a:endParaRPr lang="en-US"/>
           </a:p>
@@ -949,7 +1071,7 @@
           <a:p>
             <a:fld id="{14B70C5D-AD85-429F-99C4-8080320123EE}" type="datetimeFigureOut">
               <a:rPr lang="en-US" smtClean="0"/>
-              <a:t>12/2/2023</a:t>
+              <a:t>12/10/2023</a:t>
             </a:fld>
             <a:endParaRPr lang="en-US"/>
           </a:p>
@@ -1150,7 +1272,7 @@
           <a:p>
             <a:fld id="{14B70C5D-AD85-429F-99C4-8080320123EE}" type="datetimeFigureOut">
               <a:rPr lang="en-US" smtClean="0"/>
-              <a:t>12/2/2023</a:t>
+              <a:t>12/10/2023</a:t>
             </a:fld>
             <a:endParaRPr lang="en-US"/>
           </a:p>
@@ -1429,7 +1551,7 @@
           <a:p>
             <a:fld id="{14B70C5D-AD85-429F-99C4-8080320123EE}" type="datetimeFigureOut">
               <a:rPr lang="en-US" smtClean="0"/>
-              <a:t>12/2/2023</a:t>
+              <a:t>12/10/2023</a:t>
             </a:fld>
             <a:endParaRPr lang="en-US"/>
           </a:p>
@@ -1697,7 +1819,7 @@
           <a:p>
             <a:fld id="{14B70C5D-AD85-429F-99C4-8080320123EE}" type="datetimeFigureOut">
               <a:rPr lang="en-US" smtClean="0"/>
-              <a:t>12/2/2023</a:t>
+              <a:t>12/10/2023</a:t>
             </a:fld>
             <a:endParaRPr lang="en-US"/>
           </a:p>
@@ -2113,7 +2235,7 @@
           <a:p>
             <a:fld id="{14B70C5D-AD85-429F-99C4-8080320123EE}" type="datetimeFigureOut">
               <a:rPr lang="en-US" smtClean="0"/>
-              <a:t>12/2/2023</a:t>
+              <a:t>12/10/2023</a:t>
             </a:fld>
             <a:endParaRPr lang="en-US"/>
           </a:p>
@@ -2262,7 +2384,7 @@
           <a:p>
             <a:fld id="{14B70C5D-AD85-429F-99C4-8080320123EE}" type="datetimeFigureOut">
               <a:rPr lang="en-US" smtClean="0"/>
-              <a:t>12/2/2023</a:t>
+              <a:t>12/10/2023</a:t>
             </a:fld>
             <a:endParaRPr lang="en-US"/>
           </a:p>
@@ -2388,7 +2510,7 @@
           <a:p>
             <a:fld id="{14B70C5D-AD85-429F-99C4-8080320123EE}" type="datetimeFigureOut">
               <a:rPr lang="en-US" smtClean="0"/>
-              <a:t>12/2/2023</a:t>
+              <a:t>12/10/2023</a:t>
             </a:fld>
             <a:endParaRPr lang="en-US"/>
           </a:p>
@@ -2639,7 +2761,7 @@
           <a:p>
             <a:fld id="{14B70C5D-AD85-429F-99C4-8080320123EE}" type="datetimeFigureOut">
               <a:rPr lang="en-US" smtClean="0"/>
-              <a:t>12/2/2023</a:t>
+              <a:t>12/10/2023</a:t>
             </a:fld>
             <a:endParaRPr lang="en-US"/>
           </a:p>
@@ -3084,7 +3206,7 @@
           <a:p>
             <a:fld id="{14B70C5D-AD85-429F-99C4-8080320123EE}" type="datetimeFigureOut">
               <a:rPr lang="en-US" smtClean="0"/>
-              <a:t>12/2/2023</a:t>
+              <a:t>12/10/2023</a:t>
             </a:fld>
             <a:endParaRPr lang="en-US"/>
           </a:p>
@@ -3411,7 +3533,7 @@
           <a:p>
             <a:fld id="{14B70C5D-AD85-429F-99C4-8080320123EE}" type="datetimeFigureOut">
               <a:rPr lang="en-US" smtClean="0"/>
-              <a:t>12/2/2023</a:t>
+              <a:t>12/10/2023</a:t>
             </a:fld>
             <a:endParaRPr lang="en-US"/>
           </a:p>
@@ -4248,7 +4370,7 @@
                 <a:latin typeface="Biome" panose="020B0503030204020804" pitchFamily="34" charset="0"/>
                 <a:cs typeface="Biome" panose="020B0503030204020804" pitchFamily="34" charset="0"/>
               </a:rPr>
-              <a:t> is an application that looks at a dataset of songs to recommend songs</a:t>
+              <a:t> is an application that looks at a dataset of songs to recommend new songs</a:t>
             </a:r>
           </a:p>
           <a:p>
@@ -4351,7 +4473,206 @@
                 <a:latin typeface="Biome" panose="020B0503030204020804" pitchFamily="34" charset="0"/>
                 <a:cs typeface="Biome" panose="020B0503030204020804" pitchFamily="34" charset="0"/>
               </a:rPr>
-              <a:t>Insert diagram here…</a:t>
+              <a:t>PostgreSQL and Neo4J used to store and manipulate song data</a:t>
+            </a:r>
+          </a:p>
+          <a:p>
+            <a:r>
+              <a:rPr lang="en-US" dirty="0">
+                <a:latin typeface="Biome" panose="020B0503030204020804" pitchFamily="34" charset="0"/>
+                <a:cs typeface="Biome" panose="020B0503030204020804" pitchFamily="34" charset="0"/>
+              </a:rPr>
+              <a:t>Flask with Python used for the backend logic</a:t>
+            </a:r>
+          </a:p>
+          <a:p>
+            <a:r>
+              <a:rPr lang="en-US" dirty="0">
+                <a:latin typeface="Biome" panose="020B0503030204020804" pitchFamily="34" charset="0"/>
+                <a:cs typeface="Biome" panose="020B0503030204020804" pitchFamily="34" charset="0"/>
+              </a:rPr>
+              <a:t>Simple html/</a:t>
+            </a:r>
+            <a:r>
+              <a:rPr lang="en-US" dirty="0" err="1">
+                <a:latin typeface="Biome" panose="020B0503030204020804" pitchFamily="34" charset="0"/>
+                <a:cs typeface="Biome" panose="020B0503030204020804" pitchFamily="34" charset="0"/>
+              </a:rPr>
+              <a:t>css</a:t>
+            </a:r>
+            <a:r>
+              <a:rPr lang="en-US" dirty="0">
+                <a:latin typeface="Biome" panose="020B0503030204020804" pitchFamily="34" charset="0"/>
+                <a:cs typeface="Biome" panose="020B0503030204020804" pitchFamily="34" charset="0"/>
+              </a:rPr>
+              <a:t>/</a:t>
+            </a:r>
+            <a:r>
+              <a:rPr lang="en-US" dirty="0" err="1">
+                <a:latin typeface="Biome" panose="020B0503030204020804" pitchFamily="34" charset="0"/>
+                <a:cs typeface="Biome" panose="020B0503030204020804" pitchFamily="34" charset="0"/>
+              </a:rPr>
+              <a:t>js</a:t>
+            </a:r>
+            <a:r>
+              <a:rPr lang="en-US" dirty="0">
+                <a:latin typeface="Biome" panose="020B0503030204020804" pitchFamily="34" charset="0"/>
+                <a:cs typeface="Biome" panose="020B0503030204020804" pitchFamily="34" charset="0"/>
+              </a:rPr>
+              <a:t> used as a frontend the user is presented</a:t>
+            </a:r>
+          </a:p>
+        </p:txBody>
+      </p:sp>
+      <p:pic>
+        <p:nvPicPr>
+          <p:cNvPr id="9" name="Graphic 8">
+            <a:extLst>
+              <a:ext uri="{FF2B5EF4-FFF2-40B4-BE49-F238E27FC236}">
+                <a16:creationId xmlns:a16="http://schemas.microsoft.com/office/drawing/2014/main" id="{49CCB90E-F81E-BC2A-77E9-4DCE8560A64C}"/>
+              </a:ext>
+            </a:extLst>
+          </p:cNvPr>
+          <p:cNvPicPr>
+            <a:picLocks noChangeAspect="1"/>
+          </p:cNvPicPr>
+          <p:nvPr/>
+        </p:nvPicPr>
+        <p:blipFill>
+          <a:blip r:embed="rId2">
+            <a:extLst>
+              <a:ext uri="{28A0092B-C50C-407E-A947-70E740481C1C}">
+                <a14:useLocalDpi xmlns:a14="http://schemas.microsoft.com/office/drawing/2010/main" val="0"/>
+              </a:ext>
+              <a:ext uri="{96DAC541-7B7A-43D3-8B79-37D633B846F1}">
+                <asvg:svgBlip xmlns:asvg="http://schemas.microsoft.com/office/drawing/2016/SVG/main" r:embed="rId3"/>
+              </a:ext>
+            </a:extLst>
+          </a:blip>
+          <a:stretch>
+            <a:fillRect/>
+          </a:stretch>
+        </p:blipFill>
+        <p:spPr>
+          <a:xfrm>
+            <a:off x="1538287" y="4752164"/>
+            <a:ext cx="9115425" cy="971550"/>
+          </a:xfrm>
+          <a:prstGeom prst="rect">
+            <a:avLst/>
+          </a:prstGeom>
+        </p:spPr>
+      </p:pic>
+      <p:sp>
+        <p:nvSpPr>
+          <p:cNvPr id="11" name="TextBox 10">
+            <a:extLst>
+              <a:ext uri="{FF2B5EF4-FFF2-40B4-BE49-F238E27FC236}">
+                <a16:creationId xmlns:a16="http://schemas.microsoft.com/office/drawing/2014/main" id="{26648825-6DDE-9118-37F9-360CF5EFC203}"/>
+              </a:ext>
+            </a:extLst>
+          </p:cNvPr>
+          <p:cNvSpPr txBox="1"/>
+          <p:nvPr/>
+        </p:nvSpPr>
+        <p:spPr>
+          <a:xfrm>
+            <a:off x="1538287" y="4382832"/>
+            <a:ext cx="1487184" cy="369332"/>
+          </a:xfrm>
+          <a:prstGeom prst="rect">
+            <a:avLst/>
+          </a:prstGeom>
+          <a:noFill/>
+        </p:spPr>
+        <p:txBody>
+          <a:bodyPr wrap="square">
+            <a:spAutoFit/>
+          </a:bodyPr>
+          <a:lstStyle/>
+          <a:p>
+            <a:r>
+              <a:rPr lang="en-US" dirty="0">
+                <a:latin typeface="Biome" panose="020B0503030204020804" pitchFamily="34" charset="0"/>
+                <a:cs typeface="Biome" panose="020B0503030204020804" pitchFamily="34" charset="0"/>
+              </a:rPr>
+              <a:t>Data Layer</a:t>
+            </a:r>
+          </a:p>
+        </p:txBody>
+      </p:sp>
+      <p:sp>
+        <p:nvSpPr>
+          <p:cNvPr id="12" name="TextBox 11">
+            <a:extLst>
+              <a:ext uri="{FF2B5EF4-FFF2-40B4-BE49-F238E27FC236}">
+                <a16:creationId xmlns:a16="http://schemas.microsoft.com/office/drawing/2014/main" id="{8EDCDE07-DBE2-4B70-29FC-3465746923DB}"/>
+              </a:ext>
+            </a:extLst>
+          </p:cNvPr>
+          <p:cNvSpPr txBox="1"/>
+          <p:nvPr/>
+        </p:nvSpPr>
+        <p:spPr>
+          <a:xfrm>
+            <a:off x="4766032" y="4382832"/>
+            <a:ext cx="1487184" cy="369332"/>
+          </a:xfrm>
+          <a:prstGeom prst="rect">
+            <a:avLst/>
+          </a:prstGeom>
+          <a:noFill/>
+        </p:spPr>
+        <p:txBody>
+          <a:bodyPr wrap="square">
+            <a:spAutoFit/>
+          </a:bodyPr>
+          <a:lstStyle/>
+          <a:p>
+            <a:r>
+              <a:rPr lang="en-US" dirty="0">
+                <a:latin typeface="Biome" panose="020B0503030204020804" pitchFamily="34" charset="0"/>
+                <a:cs typeface="Biome" panose="020B0503030204020804" pitchFamily="34" charset="0"/>
+              </a:rPr>
+              <a:t>Backend</a:t>
+            </a:r>
+          </a:p>
+        </p:txBody>
+      </p:sp>
+      <p:sp>
+        <p:nvSpPr>
+          <p:cNvPr id="13" name="TextBox 12">
+            <a:extLst>
+              <a:ext uri="{FF2B5EF4-FFF2-40B4-BE49-F238E27FC236}">
+                <a16:creationId xmlns:a16="http://schemas.microsoft.com/office/drawing/2014/main" id="{3DD2B3FB-76FB-218E-17C3-71CBC3214DDE}"/>
+              </a:ext>
+            </a:extLst>
+          </p:cNvPr>
+          <p:cNvSpPr txBox="1"/>
+          <p:nvPr/>
+        </p:nvSpPr>
+        <p:spPr>
+          <a:xfrm>
+            <a:off x="7993777" y="4382832"/>
+            <a:ext cx="1487184" cy="369332"/>
+          </a:xfrm>
+          <a:prstGeom prst="rect">
+            <a:avLst/>
+          </a:prstGeom>
+          <a:noFill/>
+        </p:spPr>
+        <p:txBody>
+          <a:bodyPr wrap="square">
+            <a:spAutoFit/>
+          </a:bodyPr>
+          <a:lstStyle/>
+          <a:p>
+            <a:r>
+              <a:rPr lang="en-US" dirty="0">
+                <a:latin typeface="Biome" panose="020B0503030204020804" pitchFamily="34" charset="0"/>
+                <a:cs typeface="Biome" panose="020B0503030204020804" pitchFamily="34" charset="0"/>
+              </a:rPr>
+              <a:t>Frontend</a:t>
             </a:r>
           </a:p>
         </p:txBody>
@@ -4448,8 +4769,23 @@
                 <a:latin typeface="Biome" panose="020B0503030204020804" pitchFamily="34" charset="0"/>
                 <a:cs typeface="Biome" panose="020B0503030204020804" pitchFamily="34" charset="0"/>
               </a:rPr>
-              <a:t>A dataset of songs containing relevant song information such as artist name, </a:t>
-            </a:r>
+              <a:t>A dataset of songs containing relevant song information such as artist names, track names, album names, </a:t>
+            </a:r>
+          </a:p>
+          <a:p>
+            <a:r>
+              <a:rPr lang="en-US" dirty="0">
+                <a:latin typeface="Biome" panose="020B0503030204020804" pitchFamily="34" charset="0"/>
+                <a:cs typeface="Biome" panose="020B0503030204020804" pitchFamily="34" charset="0"/>
+              </a:rPr>
+              <a:t>A total of 114,000 entries</a:t>
+            </a:r>
+          </a:p>
+          <a:p>
+            <a:endParaRPr lang="en-US" dirty="0">
+              <a:latin typeface="Biome" panose="020B0503030204020804" pitchFamily="34" charset="0"/>
+              <a:cs typeface="Biome" panose="020B0503030204020804" pitchFamily="34" charset="0"/>
+            </a:endParaRPr>
           </a:p>
           <a:p>
             <a:endParaRPr lang="en-US" dirty="0"/>
@@ -4761,7 +5097,16 @@
                 <a:latin typeface="Biome" panose="020B0503030204020804" pitchFamily="34" charset="0"/>
                 <a:cs typeface="Biome" panose="020B0503030204020804" pitchFamily="34" charset="0"/>
               </a:rPr>
-              <a:t>Flask for WEB framework</a:t>
+              <a:t>Flask for the WEB framework</a:t>
+            </a:r>
+          </a:p>
+          <a:p>
+            <a:r>
+              <a:rPr lang="en-US" dirty="0">
+                <a:latin typeface="Biome" panose="020B0503030204020804" pitchFamily="34" charset="0"/>
+                <a:cs typeface="Biome" panose="020B0503030204020804" pitchFamily="34" charset="0"/>
+              </a:rPr>
+              <a:t>Git for version control, GitHub to store repository</a:t>
             </a:r>
           </a:p>
           <a:p>

</xml_diff>

<commit_message>
Final power point presentation slides
</commit_message>
<xml_diff>
--- a/SongSuggest.pptx
+++ b/SongSuggest.pptx
@@ -4,18 +4,23 @@
   <p:sldMasterIdLst>
     <p:sldMasterId id="2147483660" r:id="rId1"/>
   </p:sldMasterIdLst>
+  <p:notesMasterIdLst>
+    <p:notesMasterId r:id="rId15"/>
+  </p:notesMasterIdLst>
   <p:sldIdLst>
     <p:sldId id="256" r:id="rId2"/>
     <p:sldId id="257" r:id="rId3"/>
-    <p:sldId id="258" r:id="rId4"/>
+    <p:sldId id="267" r:id="rId4"/>
     <p:sldId id="259" r:id="rId5"/>
     <p:sldId id="260" r:id="rId6"/>
     <p:sldId id="261" r:id="rId7"/>
-    <p:sldId id="262" r:id="rId8"/>
-    <p:sldId id="263" r:id="rId9"/>
-    <p:sldId id="264" r:id="rId10"/>
-    <p:sldId id="265" r:id="rId11"/>
-    <p:sldId id="266" r:id="rId12"/>
+    <p:sldId id="270" r:id="rId8"/>
+    <p:sldId id="268" r:id="rId9"/>
+    <p:sldId id="263" r:id="rId10"/>
+    <p:sldId id="258" r:id="rId11"/>
+    <p:sldId id="264" r:id="rId12"/>
+    <p:sldId id="265" r:id="rId13"/>
+    <p:sldId id="266" r:id="rId14"/>
   </p:sldIdLst>
   <p:sldSz cx="12192000" cy="6858000"/>
   <p:notesSz cx="6858000" cy="9144000"/>
@@ -125,385 +130,622 @@
 <file path=ppt/revisionInfo.xml><?xml version="1.0" encoding="utf-8"?>
 <p1510:revInfo xmlns:a="http://schemas.openxmlformats.org/drawingml/2006/main" xmlns:r="http://schemas.openxmlformats.org/officeDocument/2006/relationships" xmlns:p1510="http://schemas.microsoft.com/office/powerpoint/2015/10/main">
   <p1510:revLst>
-    <p1510:client id="{583A3799-5026-4E63-B11A-CF426DF41DA8}" v="3" dt="2023-12-10T17:25:01.246"/>
+    <p1510:client id="{35A7FDD4-FEB8-A4B2-0B1A-F84232214F70}" v="48" dt="2023-12-10T18:21:58.838"/>
+    <p1510:client id="{88FF49DF-DCF7-C1FC-B4EC-B49271EB08B8}" v="170" dt="2023-12-10T20:08:15.204"/>
+    <p1510:client id="{C22A230E-8FD2-9593-7BAF-1822E059B8D6}" v="1192" dt="2023-12-10T20:08:23.274"/>
+    <p1510:client id="{CE76ABB9-4120-4693-8ECC-C57AA8C565CF}" v="802" dt="2023-12-10T19:27:45.710"/>
   </p1510:revLst>
 </p1510:revInfo>
 </file>
 
-<file path=ppt/changesInfos/changesInfo1.xml><?xml version="1.0" encoding="utf-8"?>
-<pc:chgInfo xmlns:a="http://schemas.openxmlformats.org/drawingml/2006/main" xmlns:r="http://schemas.openxmlformats.org/officeDocument/2006/relationships" xmlns:ac="http://schemas.microsoft.com/office/drawing/2013/main/command" xmlns:pc="http://schemas.microsoft.com/office/powerpoint/2013/main/command">
-  <pc:docChgLst>
-    <pc:chgData name="Vukovic, Amar" userId="ce482621-b965-46c3-9f88-db809a689d29" providerId="ADAL" clId="{EC85A1E6-63CE-4D13-8D7C-140007227A38}"/>
-    <pc:docChg chg="undo custSel addSld modSld">
-      <pc:chgData name="Vukovic, Amar" userId="ce482621-b965-46c3-9f88-db809a689d29" providerId="ADAL" clId="{EC85A1E6-63CE-4D13-8D7C-140007227A38}" dt="2023-12-02T19:59:32.670" v="1319" actId="2711"/>
-      <pc:docMkLst>
-        <pc:docMk/>
-      </pc:docMkLst>
-      <pc:sldChg chg="modSp mod">
-        <pc:chgData name="Vukovic, Amar" userId="ce482621-b965-46c3-9f88-db809a689d29" providerId="ADAL" clId="{EC85A1E6-63CE-4D13-8D7C-140007227A38}" dt="2023-12-02T19:47:43.550" v="83" actId="2711"/>
-        <pc:sldMkLst>
-          <pc:docMk/>
-          <pc:sldMk cId="2587791235" sldId="256"/>
-        </pc:sldMkLst>
-        <pc:spChg chg="mod">
-          <ac:chgData name="Vukovic, Amar" userId="ce482621-b965-46c3-9f88-db809a689d29" providerId="ADAL" clId="{EC85A1E6-63CE-4D13-8D7C-140007227A38}" dt="2023-12-02T19:47:25.149" v="81" actId="20577"/>
-          <ac:spMkLst>
-            <pc:docMk/>
-            <pc:sldMk cId="2587791235" sldId="256"/>
-            <ac:spMk id="2" creationId="{4E76ECBC-55A0-A295-68B2-49C4B372A05A}"/>
-          </ac:spMkLst>
-        </pc:spChg>
-        <pc:spChg chg="mod">
-          <ac:chgData name="Vukovic, Amar" userId="ce482621-b965-46c3-9f88-db809a689d29" providerId="ADAL" clId="{EC85A1E6-63CE-4D13-8D7C-140007227A38}" dt="2023-12-02T19:47:43.550" v="83" actId="2711"/>
-          <ac:spMkLst>
-            <pc:docMk/>
-            <pc:sldMk cId="2587791235" sldId="256"/>
-            <ac:spMk id="3" creationId="{529D40EB-5C18-C20E-90D4-38DF57615CA8}"/>
-          </ac:spMkLst>
-        </pc:spChg>
-      </pc:sldChg>
-      <pc:sldChg chg="modSp new mod">
-        <pc:chgData name="Vukovic, Amar" userId="ce482621-b965-46c3-9f88-db809a689d29" providerId="ADAL" clId="{EC85A1E6-63CE-4D13-8D7C-140007227A38}" dt="2023-12-02T19:49:22.593" v="381" actId="20577"/>
-        <pc:sldMkLst>
-          <pc:docMk/>
-          <pc:sldMk cId="736030002" sldId="257"/>
-        </pc:sldMkLst>
-        <pc:spChg chg="mod">
-          <ac:chgData name="Vukovic, Amar" userId="ce482621-b965-46c3-9f88-db809a689d29" providerId="ADAL" clId="{EC85A1E6-63CE-4D13-8D7C-140007227A38}" dt="2023-12-02T19:48:12.368" v="122" actId="20577"/>
-          <ac:spMkLst>
-            <pc:docMk/>
-            <pc:sldMk cId="736030002" sldId="257"/>
-            <ac:spMk id="2" creationId="{7076367A-7AD4-DC73-C11A-481AB3F734D2}"/>
-          </ac:spMkLst>
-        </pc:spChg>
-        <pc:spChg chg="mod">
-          <ac:chgData name="Vukovic, Amar" userId="ce482621-b965-46c3-9f88-db809a689d29" providerId="ADAL" clId="{EC85A1E6-63CE-4D13-8D7C-140007227A38}" dt="2023-12-02T19:49:22.593" v="381" actId="20577"/>
-          <ac:spMkLst>
-            <pc:docMk/>
-            <pc:sldMk cId="736030002" sldId="257"/>
-            <ac:spMk id="3" creationId="{DF1B4F32-4EAB-4298-BF3A-D7F935089BF5}"/>
-          </ac:spMkLst>
-        </pc:spChg>
-      </pc:sldChg>
-      <pc:sldChg chg="modSp new mod">
-        <pc:chgData name="Vukovic, Amar" userId="ce482621-b965-46c3-9f88-db809a689d29" providerId="ADAL" clId="{EC85A1E6-63CE-4D13-8D7C-140007227A38}" dt="2023-12-02T19:50:20.127" v="422" actId="5793"/>
-        <pc:sldMkLst>
-          <pc:docMk/>
-          <pc:sldMk cId="3043180318" sldId="258"/>
-        </pc:sldMkLst>
-        <pc:spChg chg="mod">
-          <ac:chgData name="Vukovic, Amar" userId="ce482621-b965-46c3-9f88-db809a689d29" providerId="ADAL" clId="{EC85A1E6-63CE-4D13-8D7C-140007227A38}" dt="2023-12-02T19:50:01.759" v="387" actId="207"/>
-          <ac:spMkLst>
-            <pc:docMk/>
-            <pc:sldMk cId="3043180318" sldId="258"/>
-            <ac:spMk id="2" creationId="{6F54675D-A946-9AF2-4925-9C73477F4738}"/>
-          </ac:spMkLst>
-        </pc:spChg>
-        <pc:spChg chg="mod">
-          <ac:chgData name="Vukovic, Amar" userId="ce482621-b965-46c3-9f88-db809a689d29" providerId="ADAL" clId="{EC85A1E6-63CE-4D13-8D7C-140007227A38}" dt="2023-12-02T19:50:20.127" v="422" actId="5793"/>
-          <ac:spMkLst>
-            <pc:docMk/>
-            <pc:sldMk cId="3043180318" sldId="258"/>
-            <ac:spMk id="3" creationId="{47ED5A3B-77E9-EA4F-6811-EBB026AAD82D}"/>
-          </ac:spMkLst>
-        </pc:spChg>
-      </pc:sldChg>
-      <pc:sldChg chg="modSp new mod">
-        <pc:chgData name="Vukovic, Amar" userId="ce482621-b965-46c3-9f88-db809a689d29" providerId="ADAL" clId="{EC85A1E6-63CE-4D13-8D7C-140007227A38}" dt="2023-12-02T19:53:14.982" v="630" actId="2711"/>
-        <pc:sldMkLst>
-          <pc:docMk/>
-          <pc:sldMk cId="3164650218" sldId="259"/>
-        </pc:sldMkLst>
-        <pc:spChg chg="mod">
-          <ac:chgData name="Vukovic, Amar" userId="ce482621-b965-46c3-9f88-db809a689d29" providerId="ADAL" clId="{EC85A1E6-63CE-4D13-8D7C-140007227A38}" dt="2023-12-02T19:50:48.933" v="427" actId="20577"/>
-          <ac:spMkLst>
-            <pc:docMk/>
-            <pc:sldMk cId="3164650218" sldId="259"/>
-            <ac:spMk id="2" creationId="{C4A6A181-F90D-09DC-4648-3204698C2221}"/>
-          </ac:spMkLst>
-        </pc:spChg>
-        <pc:spChg chg="mod">
-          <ac:chgData name="Vukovic, Amar" userId="ce482621-b965-46c3-9f88-db809a689d29" providerId="ADAL" clId="{EC85A1E6-63CE-4D13-8D7C-140007227A38}" dt="2023-12-02T19:53:14.982" v="630" actId="2711"/>
-          <ac:spMkLst>
-            <pc:docMk/>
-            <pc:sldMk cId="3164650218" sldId="259"/>
-            <ac:spMk id="3" creationId="{0526474C-B278-7BD0-DA99-052E71244BCA}"/>
-          </ac:spMkLst>
-        </pc:spChg>
-      </pc:sldChg>
-      <pc:sldChg chg="modSp add mod">
-        <pc:chgData name="Vukovic, Amar" userId="ce482621-b965-46c3-9f88-db809a689d29" providerId="ADAL" clId="{EC85A1E6-63CE-4D13-8D7C-140007227A38}" dt="2023-12-02T19:54:48.484" v="769"/>
-        <pc:sldMkLst>
-          <pc:docMk/>
-          <pc:sldMk cId="308930225" sldId="260"/>
-        </pc:sldMkLst>
-        <pc:spChg chg="mod">
-          <ac:chgData name="Vukovic, Amar" userId="ce482621-b965-46c3-9f88-db809a689d29" providerId="ADAL" clId="{EC85A1E6-63CE-4D13-8D7C-140007227A38}" dt="2023-12-02T19:54:07.145" v="694" actId="20577"/>
-          <ac:spMkLst>
-            <pc:docMk/>
-            <pc:sldMk cId="308930225" sldId="260"/>
-            <ac:spMk id="2" creationId="{C4A6A181-F90D-09DC-4648-3204698C2221}"/>
-          </ac:spMkLst>
-        </pc:spChg>
-        <pc:spChg chg="mod">
-          <ac:chgData name="Vukovic, Amar" userId="ce482621-b965-46c3-9f88-db809a689d29" providerId="ADAL" clId="{EC85A1E6-63CE-4D13-8D7C-140007227A38}" dt="2023-12-02T19:54:48.484" v="769"/>
-          <ac:spMkLst>
-            <pc:docMk/>
-            <pc:sldMk cId="308930225" sldId="260"/>
-            <ac:spMk id="3" creationId="{0526474C-B278-7BD0-DA99-052E71244BCA}"/>
-          </ac:spMkLst>
-        </pc:spChg>
-      </pc:sldChg>
-      <pc:sldChg chg="modSp add mod">
-        <pc:chgData name="Vukovic, Amar" userId="ce482621-b965-46c3-9f88-db809a689d29" providerId="ADAL" clId="{EC85A1E6-63CE-4D13-8D7C-140007227A38}" dt="2023-12-02T19:56:06.310" v="936" actId="20577"/>
-        <pc:sldMkLst>
-          <pc:docMk/>
-          <pc:sldMk cId="3374633492" sldId="261"/>
-        </pc:sldMkLst>
-        <pc:spChg chg="mod">
-          <ac:chgData name="Vukovic, Amar" userId="ce482621-b965-46c3-9f88-db809a689d29" providerId="ADAL" clId="{EC85A1E6-63CE-4D13-8D7C-140007227A38}" dt="2023-12-02T19:55:22.482" v="810" actId="20577"/>
-          <ac:spMkLst>
-            <pc:docMk/>
-            <pc:sldMk cId="3374633492" sldId="261"/>
-            <ac:spMk id="2" creationId="{C4A6A181-F90D-09DC-4648-3204698C2221}"/>
-          </ac:spMkLst>
-        </pc:spChg>
-        <pc:spChg chg="mod">
-          <ac:chgData name="Vukovic, Amar" userId="ce482621-b965-46c3-9f88-db809a689d29" providerId="ADAL" clId="{EC85A1E6-63CE-4D13-8D7C-140007227A38}" dt="2023-12-02T19:56:06.310" v="936" actId="20577"/>
-          <ac:spMkLst>
-            <pc:docMk/>
-            <pc:sldMk cId="3374633492" sldId="261"/>
-            <ac:spMk id="3" creationId="{0526474C-B278-7BD0-DA99-052E71244BCA}"/>
-          </ac:spMkLst>
-        </pc:spChg>
-      </pc:sldChg>
-      <pc:sldChg chg="modSp add mod">
-        <pc:chgData name="Vukovic, Amar" userId="ce482621-b965-46c3-9f88-db809a689d29" providerId="ADAL" clId="{EC85A1E6-63CE-4D13-8D7C-140007227A38}" dt="2023-12-02T19:57:32.489" v="1100" actId="2711"/>
-        <pc:sldMkLst>
-          <pc:docMk/>
-          <pc:sldMk cId="178626268" sldId="262"/>
-        </pc:sldMkLst>
-        <pc:spChg chg="mod">
-          <ac:chgData name="Vukovic, Amar" userId="ce482621-b965-46c3-9f88-db809a689d29" providerId="ADAL" clId="{EC85A1E6-63CE-4D13-8D7C-140007227A38}" dt="2023-12-02T19:56:18.355" v="964" actId="20577"/>
-          <ac:spMkLst>
-            <pc:docMk/>
-            <pc:sldMk cId="178626268" sldId="262"/>
-            <ac:spMk id="2" creationId="{C4A6A181-F90D-09DC-4648-3204698C2221}"/>
-          </ac:spMkLst>
-        </pc:spChg>
-        <pc:spChg chg="mod">
-          <ac:chgData name="Vukovic, Amar" userId="ce482621-b965-46c3-9f88-db809a689d29" providerId="ADAL" clId="{EC85A1E6-63CE-4D13-8D7C-140007227A38}" dt="2023-12-02T19:57:32.489" v="1100" actId="2711"/>
-          <ac:spMkLst>
-            <pc:docMk/>
-            <pc:sldMk cId="178626268" sldId="262"/>
-            <ac:spMk id="3" creationId="{0526474C-B278-7BD0-DA99-052E71244BCA}"/>
-          </ac:spMkLst>
-        </pc:spChg>
-      </pc:sldChg>
-      <pc:sldChg chg="modSp add mod">
-        <pc:chgData name="Vukovic, Amar" userId="ce482621-b965-46c3-9f88-db809a689d29" providerId="ADAL" clId="{EC85A1E6-63CE-4D13-8D7C-140007227A38}" dt="2023-12-02T19:58:09.840" v="1179" actId="20577"/>
-        <pc:sldMkLst>
-          <pc:docMk/>
-          <pc:sldMk cId="1579072734" sldId="263"/>
-        </pc:sldMkLst>
-        <pc:spChg chg="mod">
-          <ac:chgData name="Vukovic, Amar" userId="ce482621-b965-46c3-9f88-db809a689d29" providerId="ADAL" clId="{EC85A1E6-63CE-4D13-8D7C-140007227A38}" dt="2023-12-02T19:57:50.778" v="1110" actId="20577"/>
-          <ac:spMkLst>
-            <pc:docMk/>
-            <pc:sldMk cId="1579072734" sldId="263"/>
-            <ac:spMk id="2" creationId="{C4A6A181-F90D-09DC-4648-3204698C2221}"/>
-          </ac:spMkLst>
-        </pc:spChg>
-        <pc:spChg chg="mod">
-          <ac:chgData name="Vukovic, Amar" userId="ce482621-b965-46c3-9f88-db809a689d29" providerId="ADAL" clId="{EC85A1E6-63CE-4D13-8D7C-140007227A38}" dt="2023-12-02T19:58:09.840" v="1179" actId="20577"/>
-          <ac:spMkLst>
-            <pc:docMk/>
-            <pc:sldMk cId="1579072734" sldId="263"/>
-            <ac:spMk id="3" creationId="{0526474C-B278-7BD0-DA99-052E71244BCA}"/>
-          </ac:spMkLst>
-        </pc:spChg>
-      </pc:sldChg>
-      <pc:sldChg chg="modSp add mod">
-        <pc:chgData name="Vukovic, Amar" userId="ce482621-b965-46c3-9f88-db809a689d29" providerId="ADAL" clId="{EC85A1E6-63CE-4D13-8D7C-140007227A38}" dt="2023-12-02T19:58:23.938" v="1193" actId="20577"/>
-        <pc:sldMkLst>
-          <pc:docMk/>
-          <pc:sldMk cId="591788664" sldId="264"/>
-        </pc:sldMkLst>
-        <pc:spChg chg="mod">
-          <ac:chgData name="Vukovic, Amar" userId="ce482621-b965-46c3-9f88-db809a689d29" providerId="ADAL" clId="{EC85A1E6-63CE-4D13-8D7C-140007227A38}" dt="2023-12-02T19:58:23.938" v="1193" actId="20577"/>
-          <ac:spMkLst>
-            <pc:docMk/>
-            <pc:sldMk cId="591788664" sldId="264"/>
-            <ac:spMk id="2" creationId="{C4A6A181-F90D-09DC-4648-3204698C2221}"/>
-          </ac:spMkLst>
-        </pc:spChg>
-      </pc:sldChg>
-      <pc:sldChg chg="modSp add mod">
-        <pc:chgData name="Vukovic, Amar" userId="ce482621-b965-46c3-9f88-db809a689d29" providerId="ADAL" clId="{EC85A1E6-63CE-4D13-8D7C-140007227A38}" dt="2023-12-02T19:58:57.796" v="1242" actId="20577"/>
-        <pc:sldMkLst>
-          <pc:docMk/>
-          <pc:sldMk cId="2288077047" sldId="265"/>
-        </pc:sldMkLst>
-        <pc:spChg chg="mod">
-          <ac:chgData name="Vukovic, Amar" userId="ce482621-b965-46c3-9f88-db809a689d29" providerId="ADAL" clId="{EC85A1E6-63CE-4D13-8D7C-140007227A38}" dt="2023-12-02T19:58:57.796" v="1242" actId="20577"/>
-          <ac:spMkLst>
-            <pc:docMk/>
-            <pc:sldMk cId="2288077047" sldId="265"/>
-            <ac:spMk id="2" creationId="{C4A6A181-F90D-09DC-4648-3204698C2221}"/>
-          </ac:spMkLst>
-        </pc:spChg>
-        <pc:spChg chg="mod">
-          <ac:chgData name="Vukovic, Amar" userId="ce482621-b965-46c3-9f88-db809a689d29" providerId="ADAL" clId="{EC85A1E6-63CE-4D13-8D7C-140007227A38}" dt="2023-12-02T19:58:54.189" v="1234" actId="20577"/>
-          <ac:spMkLst>
-            <pc:docMk/>
-            <pc:sldMk cId="2288077047" sldId="265"/>
-            <ac:spMk id="3" creationId="{0526474C-B278-7BD0-DA99-052E71244BCA}"/>
-          </ac:spMkLst>
-        </pc:spChg>
-      </pc:sldChg>
-      <pc:sldChg chg="modSp add mod">
-        <pc:chgData name="Vukovic, Amar" userId="ce482621-b965-46c3-9f88-db809a689d29" providerId="ADAL" clId="{EC85A1E6-63CE-4D13-8D7C-140007227A38}" dt="2023-12-02T19:59:32.670" v="1319" actId="2711"/>
-        <pc:sldMkLst>
-          <pc:docMk/>
-          <pc:sldMk cId="3762594592" sldId="266"/>
-        </pc:sldMkLst>
-        <pc:spChg chg="mod">
-          <ac:chgData name="Vukovic, Amar" userId="ce482621-b965-46c3-9f88-db809a689d29" providerId="ADAL" clId="{EC85A1E6-63CE-4D13-8D7C-140007227A38}" dt="2023-12-02T19:59:13.422" v="1260" actId="20577"/>
-          <ac:spMkLst>
-            <pc:docMk/>
-            <pc:sldMk cId="3762594592" sldId="266"/>
-            <ac:spMk id="2" creationId="{C4A6A181-F90D-09DC-4648-3204698C2221}"/>
-          </ac:spMkLst>
-        </pc:spChg>
-        <pc:spChg chg="mod">
-          <ac:chgData name="Vukovic, Amar" userId="ce482621-b965-46c3-9f88-db809a689d29" providerId="ADAL" clId="{EC85A1E6-63CE-4D13-8D7C-140007227A38}" dt="2023-12-02T19:59:32.670" v="1319" actId="2711"/>
-          <ac:spMkLst>
-            <pc:docMk/>
-            <pc:sldMk cId="3762594592" sldId="266"/>
-            <ac:spMk id="3" creationId="{0526474C-B278-7BD0-DA99-052E71244BCA}"/>
-          </ac:spMkLst>
-        </pc:spChg>
-      </pc:sldChg>
-    </pc:docChg>
-  </pc:docChgLst>
-  <pc:docChgLst>
-    <pc:chgData name="Vukovic, Amar" userId="ce482621-b965-46c3-9f88-db809a689d29" providerId="ADAL" clId="{583A3799-5026-4E63-B11A-CF426DF41DA8}"/>
-    <pc:docChg chg="undo custSel modSld">
-      <pc:chgData name="Vukovic, Amar" userId="ce482621-b965-46c3-9f88-db809a689d29" providerId="ADAL" clId="{583A3799-5026-4E63-B11A-CF426DF41DA8}" dt="2023-12-10T17:33:31.914" v="575" actId="20577"/>
-      <pc:docMkLst>
-        <pc:docMk/>
-      </pc:docMkLst>
-      <pc:sldChg chg="modSp mod">
-        <pc:chgData name="Vukovic, Amar" userId="ce482621-b965-46c3-9f88-db809a689d29" providerId="ADAL" clId="{583A3799-5026-4E63-B11A-CF426DF41DA8}" dt="2023-12-10T17:28:55.127" v="415" actId="20577"/>
-        <pc:sldMkLst>
-          <pc:docMk/>
-          <pc:sldMk cId="736030002" sldId="257"/>
-        </pc:sldMkLst>
-        <pc:spChg chg="mod">
-          <ac:chgData name="Vukovic, Amar" userId="ce482621-b965-46c3-9f88-db809a689d29" providerId="ADAL" clId="{583A3799-5026-4E63-B11A-CF426DF41DA8}" dt="2023-12-10T17:28:55.127" v="415" actId="20577"/>
-          <ac:spMkLst>
-            <pc:docMk/>
-            <pc:sldMk cId="736030002" sldId="257"/>
-            <ac:spMk id="3" creationId="{DF1B4F32-4EAB-4298-BF3A-D7F935089BF5}"/>
-          </ac:spMkLst>
-        </pc:spChg>
-      </pc:sldChg>
-      <pc:sldChg chg="addSp delSp modSp mod">
-        <pc:chgData name="Vukovic, Amar" userId="ce482621-b965-46c3-9f88-db809a689d29" providerId="ADAL" clId="{583A3799-5026-4E63-B11A-CF426DF41DA8}" dt="2023-12-10T17:28:41.091" v="409" actId="20577"/>
-        <pc:sldMkLst>
-          <pc:docMk/>
-          <pc:sldMk cId="3043180318" sldId="258"/>
-        </pc:sldMkLst>
-        <pc:spChg chg="mod">
-          <ac:chgData name="Vukovic, Amar" userId="ce482621-b965-46c3-9f88-db809a689d29" providerId="ADAL" clId="{583A3799-5026-4E63-B11A-CF426DF41DA8}" dt="2023-12-10T17:28:41.091" v="409" actId="20577"/>
-          <ac:spMkLst>
-            <pc:docMk/>
-            <pc:sldMk cId="3043180318" sldId="258"/>
-            <ac:spMk id="3" creationId="{47ED5A3B-77E9-EA4F-6811-EBB026AAD82D}"/>
-          </ac:spMkLst>
-        </pc:spChg>
-        <pc:spChg chg="add del">
-          <ac:chgData name="Vukovic, Amar" userId="ce482621-b965-46c3-9f88-db809a689d29" providerId="ADAL" clId="{583A3799-5026-4E63-B11A-CF426DF41DA8}" dt="2023-12-10T17:21:41.100" v="1" actId="22"/>
-          <ac:spMkLst>
-            <pc:docMk/>
-            <pc:sldMk cId="3043180318" sldId="258"/>
-            <ac:spMk id="5" creationId="{25B43C04-E51A-75E0-EAB2-5EE538CC37C1}"/>
-          </ac:spMkLst>
-        </pc:spChg>
-        <pc:spChg chg="add del">
-          <ac:chgData name="Vukovic, Amar" userId="ce482621-b965-46c3-9f88-db809a689d29" providerId="ADAL" clId="{583A3799-5026-4E63-B11A-CF426DF41DA8}" dt="2023-12-10T17:22:07.947" v="3" actId="22"/>
-          <ac:spMkLst>
-            <pc:docMk/>
-            <pc:sldMk cId="3043180318" sldId="258"/>
-            <ac:spMk id="7" creationId="{8CDB8FD9-5B0E-C295-5030-C66388B47216}"/>
-          </ac:spMkLst>
-        </pc:spChg>
-        <pc:spChg chg="add mod">
-          <ac:chgData name="Vukovic, Amar" userId="ce482621-b965-46c3-9f88-db809a689d29" providerId="ADAL" clId="{583A3799-5026-4E63-B11A-CF426DF41DA8}" dt="2023-12-10T17:25:22.512" v="135" actId="1035"/>
-          <ac:spMkLst>
-            <pc:docMk/>
-            <pc:sldMk cId="3043180318" sldId="258"/>
-            <ac:spMk id="11" creationId="{26648825-6DDE-9118-37F9-360CF5EFC203}"/>
-          </ac:spMkLst>
-        </pc:spChg>
-        <pc:spChg chg="add mod">
-          <ac:chgData name="Vukovic, Amar" userId="ce482621-b965-46c3-9f88-db809a689d29" providerId="ADAL" clId="{583A3799-5026-4E63-B11A-CF426DF41DA8}" dt="2023-12-10T17:25:22.512" v="135" actId="1035"/>
-          <ac:spMkLst>
-            <pc:docMk/>
-            <pc:sldMk cId="3043180318" sldId="258"/>
-            <ac:spMk id="12" creationId="{8EDCDE07-DBE2-4B70-29FC-3465746923DB}"/>
-          </ac:spMkLst>
-        </pc:spChg>
-        <pc:spChg chg="add mod">
-          <ac:chgData name="Vukovic, Amar" userId="ce482621-b965-46c3-9f88-db809a689d29" providerId="ADAL" clId="{583A3799-5026-4E63-B11A-CF426DF41DA8}" dt="2023-12-10T17:25:22.512" v="135" actId="1035"/>
-          <ac:spMkLst>
-            <pc:docMk/>
-            <pc:sldMk cId="3043180318" sldId="258"/>
-            <ac:spMk id="13" creationId="{3DD2B3FB-76FB-218E-17C3-71CBC3214DDE}"/>
-          </ac:spMkLst>
-        </pc:spChg>
-        <pc:picChg chg="add mod">
-          <ac:chgData name="Vukovic, Amar" userId="ce482621-b965-46c3-9f88-db809a689d29" providerId="ADAL" clId="{583A3799-5026-4E63-B11A-CF426DF41DA8}" dt="2023-12-10T17:25:22.512" v="135" actId="1035"/>
-          <ac:picMkLst>
-            <pc:docMk/>
-            <pc:sldMk cId="3043180318" sldId="258"/>
-            <ac:picMk id="9" creationId="{49CCB90E-F81E-BC2A-77E9-4DCE8560A64C}"/>
-          </ac:picMkLst>
-        </pc:picChg>
-      </pc:sldChg>
-      <pc:sldChg chg="modSp mod">
-        <pc:chgData name="Vukovic, Amar" userId="ce482621-b965-46c3-9f88-db809a689d29" providerId="ADAL" clId="{583A3799-5026-4E63-B11A-CF426DF41DA8}" dt="2023-12-10T17:33:31.914" v="575" actId="20577"/>
-        <pc:sldMkLst>
-          <pc:docMk/>
-          <pc:sldMk cId="3164650218" sldId="259"/>
-        </pc:sldMkLst>
-        <pc:spChg chg="mod">
-          <ac:chgData name="Vukovic, Amar" userId="ce482621-b965-46c3-9f88-db809a689d29" providerId="ADAL" clId="{583A3799-5026-4E63-B11A-CF426DF41DA8}" dt="2023-12-10T17:33:31.914" v="575" actId="20577"/>
-          <ac:spMkLst>
-            <pc:docMk/>
-            <pc:sldMk cId="3164650218" sldId="259"/>
-            <ac:spMk id="3" creationId="{0526474C-B278-7BD0-DA99-052E71244BCA}"/>
-          </ac:spMkLst>
-        </pc:spChg>
-      </pc:sldChg>
-      <pc:sldChg chg="modSp mod">
-        <pc:chgData name="Vukovic, Amar" userId="ce482621-b965-46c3-9f88-db809a689d29" providerId="ADAL" clId="{583A3799-5026-4E63-B11A-CF426DF41DA8}" dt="2023-12-10T17:31:01.507" v="574" actId="20577"/>
-        <pc:sldMkLst>
-          <pc:docMk/>
-          <pc:sldMk cId="178626268" sldId="262"/>
-        </pc:sldMkLst>
-        <pc:spChg chg="mod">
-          <ac:chgData name="Vukovic, Amar" userId="ce482621-b965-46c3-9f88-db809a689d29" providerId="ADAL" clId="{583A3799-5026-4E63-B11A-CF426DF41DA8}" dt="2023-12-10T17:31:01.507" v="574" actId="20577"/>
-          <ac:spMkLst>
-            <pc:docMk/>
-            <pc:sldMk cId="178626268" sldId="262"/>
-            <ac:spMk id="3" creationId="{0526474C-B278-7BD0-DA99-052E71244BCA}"/>
-          </ac:spMkLst>
-        </pc:spChg>
-      </pc:sldChg>
-    </pc:docChg>
-  </pc:docChgLst>
-</pc:chgInfo>
+<file path=ppt/notesMasters/notesMaster1.xml><?xml version="1.0" encoding="utf-8"?>
+<p:notesMaster xmlns:a="http://schemas.openxmlformats.org/drawingml/2006/main" xmlns:r="http://schemas.openxmlformats.org/officeDocument/2006/relationships" xmlns:p="http://schemas.openxmlformats.org/presentationml/2006/main">
+  <p:cSld>
+    <p:bg>
+      <p:bgRef idx="1001">
+        <a:schemeClr val="bg1"/>
+      </p:bgRef>
+    </p:bg>
+    <p:spTree>
+      <p:nvGrpSpPr>
+        <p:cNvPr id="1" name=""/>
+        <p:cNvGrpSpPr/>
+        <p:nvPr/>
+      </p:nvGrpSpPr>
+      <p:grpSpPr>
+        <a:xfrm>
+          <a:off x="0" y="0"/>
+          <a:ext cx="0" cy="0"/>
+          <a:chOff x="0" y="0"/>
+          <a:chExt cx="0" cy="0"/>
+        </a:xfrm>
+      </p:grpSpPr>
+      <p:sp>
+        <p:nvSpPr>
+          <p:cNvPr id="2" name="Header Placeholder 1"/>
+          <p:cNvSpPr>
+            <a:spLocks noGrp="1"/>
+          </p:cNvSpPr>
+          <p:nvPr>
+            <p:ph type="hdr" sz="quarter"/>
+          </p:nvPr>
+        </p:nvSpPr>
+        <p:spPr>
+          <a:xfrm>
+            <a:off x="0" y="0"/>
+            <a:ext cx="2971800" cy="458788"/>
+          </a:xfrm>
+          <a:prstGeom prst="rect">
+            <a:avLst/>
+          </a:prstGeom>
+        </p:spPr>
+        <p:txBody>
+          <a:bodyPr vert="horz" lIns="91440" tIns="45720" rIns="91440" bIns="45720" rtlCol="0"/>
+          <a:lstStyle>
+            <a:lvl1pPr algn="l">
+              <a:defRPr sz="1200"/>
+            </a:lvl1pPr>
+          </a:lstStyle>
+          <a:p>
+            <a:endParaRPr lang="en-US"/>
+          </a:p>
+        </p:txBody>
+      </p:sp>
+      <p:sp>
+        <p:nvSpPr>
+          <p:cNvPr id="3" name="Date Placeholder 2"/>
+          <p:cNvSpPr>
+            <a:spLocks noGrp="1"/>
+          </p:cNvSpPr>
+          <p:nvPr>
+            <p:ph type="dt" idx="1"/>
+          </p:nvPr>
+        </p:nvSpPr>
+        <p:spPr>
+          <a:xfrm>
+            <a:off x="3884613" y="0"/>
+            <a:ext cx="2971800" cy="458788"/>
+          </a:xfrm>
+          <a:prstGeom prst="rect">
+            <a:avLst/>
+          </a:prstGeom>
+        </p:spPr>
+        <p:txBody>
+          <a:bodyPr vert="horz" lIns="91440" tIns="45720" rIns="91440" bIns="45720" rtlCol="0"/>
+          <a:lstStyle>
+            <a:lvl1pPr algn="r">
+              <a:defRPr sz="1200"/>
+            </a:lvl1pPr>
+          </a:lstStyle>
+          <a:p>
+            <a:fld id="{36FECF2C-D0BA-4AA2-8800-84D01FD83E8C}" type="datetimeFigureOut">
+              <a:rPr lang="en-US" smtClean="0"/>
+              <a:t>12/10/2023</a:t>
+            </a:fld>
+            <a:endParaRPr lang="en-US"/>
+          </a:p>
+        </p:txBody>
+      </p:sp>
+      <p:sp>
+        <p:nvSpPr>
+          <p:cNvPr id="4" name="Slide Image Placeholder 3"/>
+          <p:cNvSpPr>
+            <a:spLocks noGrp="1" noRot="1" noChangeAspect="1"/>
+          </p:cNvSpPr>
+          <p:nvPr>
+            <p:ph type="sldImg" idx="2"/>
+          </p:nvPr>
+        </p:nvSpPr>
+        <p:spPr>
+          <a:xfrm>
+            <a:off x="685800" y="1143000"/>
+            <a:ext cx="5486400" cy="3086100"/>
+          </a:xfrm>
+          <a:prstGeom prst="rect">
+            <a:avLst/>
+          </a:prstGeom>
+          <a:noFill/>
+          <a:ln w="12700">
+            <a:solidFill>
+              <a:prstClr val="black"/>
+            </a:solidFill>
+          </a:ln>
+        </p:spPr>
+        <p:txBody>
+          <a:bodyPr vert="horz" lIns="91440" tIns="45720" rIns="91440" bIns="45720" rtlCol="0" anchor="ctr"/>
+          <a:lstStyle/>
+          <a:p>
+            <a:endParaRPr lang="en-US"/>
+          </a:p>
+        </p:txBody>
+      </p:sp>
+      <p:sp>
+        <p:nvSpPr>
+          <p:cNvPr id="5" name="Notes Placeholder 4"/>
+          <p:cNvSpPr>
+            <a:spLocks noGrp="1"/>
+          </p:cNvSpPr>
+          <p:nvPr>
+            <p:ph type="body" sz="quarter" idx="3"/>
+          </p:nvPr>
+        </p:nvSpPr>
+        <p:spPr>
+          <a:xfrm>
+            <a:off x="685800" y="4400550"/>
+            <a:ext cx="5486400" cy="3600450"/>
+          </a:xfrm>
+          <a:prstGeom prst="rect">
+            <a:avLst/>
+          </a:prstGeom>
+        </p:spPr>
+        <p:txBody>
+          <a:bodyPr vert="horz" lIns="91440" tIns="45720" rIns="91440" bIns="45720" rtlCol="0"/>
+          <a:lstStyle/>
+          <a:p>
+            <a:pPr lvl="0"/>
+            <a:r>
+              <a:rPr lang="en-US"/>
+              <a:t>Click to edit Master text styles</a:t>
+            </a:r>
+          </a:p>
+          <a:p>
+            <a:pPr lvl="1"/>
+            <a:r>
+              <a:rPr lang="en-US"/>
+              <a:t>Second level</a:t>
+            </a:r>
+          </a:p>
+          <a:p>
+            <a:pPr lvl="2"/>
+            <a:r>
+              <a:rPr lang="en-US"/>
+              <a:t>Third level</a:t>
+            </a:r>
+          </a:p>
+          <a:p>
+            <a:pPr lvl="3"/>
+            <a:r>
+              <a:rPr lang="en-US"/>
+              <a:t>Fourth level</a:t>
+            </a:r>
+          </a:p>
+          <a:p>
+            <a:pPr lvl="4"/>
+            <a:r>
+              <a:rPr lang="en-US"/>
+              <a:t>Fifth level</a:t>
+            </a:r>
+          </a:p>
+        </p:txBody>
+      </p:sp>
+      <p:sp>
+        <p:nvSpPr>
+          <p:cNvPr id="6" name="Footer Placeholder 5"/>
+          <p:cNvSpPr>
+            <a:spLocks noGrp="1"/>
+          </p:cNvSpPr>
+          <p:nvPr>
+            <p:ph type="ftr" sz="quarter" idx="4"/>
+          </p:nvPr>
+        </p:nvSpPr>
+        <p:spPr>
+          <a:xfrm>
+            <a:off x="0" y="8685213"/>
+            <a:ext cx="2971800" cy="458787"/>
+          </a:xfrm>
+          <a:prstGeom prst="rect">
+            <a:avLst/>
+          </a:prstGeom>
+        </p:spPr>
+        <p:txBody>
+          <a:bodyPr vert="horz" lIns="91440" tIns="45720" rIns="91440" bIns="45720" rtlCol="0" anchor="b"/>
+          <a:lstStyle>
+            <a:lvl1pPr algn="l">
+              <a:defRPr sz="1200"/>
+            </a:lvl1pPr>
+          </a:lstStyle>
+          <a:p>
+            <a:endParaRPr lang="en-US"/>
+          </a:p>
+        </p:txBody>
+      </p:sp>
+      <p:sp>
+        <p:nvSpPr>
+          <p:cNvPr id="7" name="Slide Number Placeholder 6"/>
+          <p:cNvSpPr>
+            <a:spLocks noGrp="1"/>
+          </p:cNvSpPr>
+          <p:nvPr>
+            <p:ph type="sldNum" sz="quarter" idx="5"/>
+          </p:nvPr>
+        </p:nvSpPr>
+        <p:spPr>
+          <a:xfrm>
+            <a:off x="3884613" y="8685213"/>
+            <a:ext cx="2971800" cy="458787"/>
+          </a:xfrm>
+          <a:prstGeom prst="rect">
+            <a:avLst/>
+          </a:prstGeom>
+        </p:spPr>
+        <p:txBody>
+          <a:bodyPr vert="horz" lIns="91440" tIns="45720" rIns="91440" bIns="45720" rtlCol="0" anchor="b"/>
+          <a:lstStyle>
+            <a:lvl1pPr algn="r">
+              <a:defRPr sz="1200"/>
+            </a:lvl1pPr>
+          </a:lstStyle>
+          <a:p>
+            <a:fld id="{28799E38-8F9F-49A5-A8CC-F4BFCC761885}" type="slidenum">
+              <a:rPr lang="en-US" smtClean="0"/>
+              <a:t>‹#›</a:t>
+            </a:fld>
+            <a:endParaRPr lang="en-US"/>
+          </a:p>
+        </p:txBody>
+      </p:sp>
+    </p:spTree>
+    <p:extLst>
+      <p:ext uri="{BB962C8B-B14F-4D97-AF65-F5344CB8AC3E}">
+        <p14:creationId xmlns:p14="http://schemas.microsoft.com/office/powerpoint/2010/main" val="240678555"/>
+      </p:ext>
+    </p:extLst>
+  </p:cSld>
+  <p:clrMap bg1="lt1" tx1="dk1" bg2="lt2" tx2="dk2" accent1="accent1" accent2="accent2" accent3="accent3" accent4="accent4" accent5="accent5" accent6="accent6" hlink="hlink" folHlink="folHlink"/>
+  <p:notesStyle>
+    <a:lvl1pPr marL="0" algn="l" defTabSz="914400" rtl="0" eaLnBrk="1" latinLnBrk="0" hangingPunct="1">
+      <a:defRPr sz="1200" kern="1200">
+        <a:solidFill>
+          <a:schemeClr val="tx1"/>
+        </a:solidFill>
+        <a:latin typeface="+mn-lt"/>
+        <a:ea typeface="+mn-ea"/>
+        <a:cs typeface="+mn-cs"/>
+      </a:defRPr>
+    </a:lvl1pPr>
+    <a:lvl2pPr marL="457200" algn="l" defTabSz="914400" rtl="0" eaLnBrk="1" latinLnBrk="0" hangingPunct="1">
+      <a:defRPr sz="1200" kern="1200">
+        <a:solidFill>
+          <a:schemeClr val="tx1"/>
+        </a:solidFill>
+        <a:latin typeface="+mn-lt"/>
+        <a:ea typeface="+mn-ea"/>
+        <a:cs typeface="+mn-cs"/>
+      </a:defRPr>
+    </a:lvl2pPr>
+    <a:lvl3pPr marL="914400" algn="l" defTabSz="914400" rtl="0" eaLnBrk="1" latinLnBrk="0" hangingPunct="1">
+      <a:defRPr sz="1200" kern="1200">
+        <a:solidFill>
+          <a:schemeClr val="tx1"/>
+        </a:solidFill>
+        <a:latin typeface="+mn-lt"/>
+        <a:ea typeface="+mn-ea"/>
+        <a:cs typeface="+mn-cs"/>
+      </a:defRPr>
+    </a:lvl3pPr>
+    <a:lvl4pPr marL="1371600" algn="l" defTabSz="914400" rtl="0" eaLnBrk="1" latinLnBrk="0" hangingPunct="1">
+      <a:defRPr sz="1200" kern="1200">
+        <a:solidFill>
+          <a:schemeClr val="tx1"/>
+        </a:solidFill>
+        <a:latin typeface="+mn-lt"/>
+        <a:ea typeface="+mn-ea"/>
+        <a:cs typeface="+mn-cs"/>
+      </a:defRPr>
+    </a:lvl4pPr>
+    <a:lvl5pPr marL="1828800" algn="l" defTabSz="914400" rtl="0" eaLnBrk="1" latinLnBrk="0" hangingPunct="1">
+      <a:defRPr sz="1200" kern="1200">
+        <a:solidFill>
+          <a:schemeClr val="tx1"/>
+        </a:solidFill>
+        <a:latin typeface="+mn-lt"/>
+        <a:ea typeface="+mn-ea"/>
+        <a:cs typeface="+mn-cs"/>
+      </a:defRPr>
+    </a:lvl5pPr>
+    <a:lvl6pPr marL="2286000" algn="l" defTabSz="914400" rtl="0" eaLnBrk="1" latinLnBrk="0" hangingPunct="1">
+      <a:defRPr sz="1200" kern="1200">
+        <a:solidFill>
+          <a:schemeClr val="tx1"/>
+        </a:solidFill>
+        <a:latin typeface="+mn-lt"/>
+        <a:ea typeface="+mn-ea"/>
+        <a:cs typeface="+mn-cs"/>
+      </a:defRPr>
+    </a:lvl6pPr>
+    <a:lvl7pPr marL="2743200" algn="l" defTabSz="914400" rtl="0" eaLnBrk="1" latinLnBrk="0" hangingPunct="1">
+      <a:defRPr sz="1200" kern="1200">
+        <a:solidFill>
+          <a:schemeClr val="tx1"/>
+        </a:solidFill>
+        <a:latin typeface="+mn-lt"/>
+        <a:ea typeface="+mn-ea"/>
+        <a:cs typeface="+mn-cs"/>
+      </a:defRPr>
+    </a:lvl7pPr>
+    <a:lvl8pPr marL="3200400" algn="l" defTabSz="914400" rtl="0" eaLnBrk="1" latinLnBrk="0" hangingPunct="1">
+      <a:defRPr sz="1200" kern="1200">
+        <a:solidFill>
+          <a:schemeClr val="tx1"/>
+        </a:solidFill>
+        <a:latin typeface="+mn-lt"/>
+        <a:ea typeface="+mn-ea"/>
+        <a:cs typeface="+mn-cs"/>
+      </a:defRPr>
+    </a:lvl8pPr>
+    <a:lvl9pPr marL="3657600" algn="l" defTabSz="914400" rtl="0" eaLnBrk="1" latinLnBrk="0" hangingPunct="1">
+      <a:defRPr sz="1200" kern="1200">
+        <a:solidFill>
+          <a:schemeClr val="tx1"/>
+        </a:solidFill>
+        <a:latin typeface="+mn-lt"/>
+        <a:ea typeface="+mn-ea"/>
+        <a:cs typeface="+mn-cs"/>
+      </a:defRPr>
+    </a:lvl9pPr>
+  </p:notesStyle>
+</p:notesMaster>
+</file>
+
+<file path=ppt/notesSlides/notesSlide1.xml><?xml version="1.0" encoding="utf-8"?>
+<p:notes xmlns:a="http://schemas.openxmlformats.org/drawingml/2006/main" xmlns:r="http://schemas.openxmlformats.org/officeDocument/2006/relationships" xmlns:p="http://schemas.openxmlformats.org/presentationml/2006/main">
+  <p:cSld>
+    <p:spTree>
+      <p:nvGrpSpPr>
+        <p:cNvPr id="1" name=""/>
+        <p:cNvGrpSpPr/>
+        <p:nvPr/>
+      </p:nvGrpSpPr>
+      <p:grpSpPr>
+        <a:xfrm>
+          <a:off x="0" y="0"/>
+          <a:ext cx="0" cy="0"/>
+          <a:chOff x="0" y="0"/>
+          <a:chExt cx="0" cy="0"/>
+        </a:xfrm>
+      </p:grpSpPr>
+      <p:sp>
+        <p:nvSpPr>
+          <p:cNvPr id="2" name="Slide Image Placeholder 1"/>
+          <p:cNvSpPr>
+            <a:spLocks noGrp="1" noRot="1" noChangeAspect="1"/>
+          </p:cNvSpPr>
+          <p:nvPr>
+            <p:ph type="sldImg"/>
+          </p:nvPr>
+        </p:nvSpPr>
+        <p:spPr/>
+      </p:sp>
+      <p:sp>
+        <p:nvSpPr>
+          <p:cNvPr id="3" name="Notes Placeholder 2"/>
+          <p:cNvSpPr>
+            <a:spLocks noGrp="1"/>
+          </p:cNvSpPr>
+          <p:nvPr>
+            <p:ph type="body" idx="1"/>
+          </p:nvPr>
+        </p:nvSpPr>
+        <p:spPr/>
+        <p:txBody>
+          <a:bodyPr/>
+          <a:lstStyle/>
+          <a:p>
+            <a:r>
+              <a:rPr lang="en-US"/>
+              <a:t>114,000 rows by 21 columns</a:t>
+            </a:r>
+          </a:p>
+        </p:txBody>
+      </p:sp>
+      <p:sp>
+        <p:nvSpPr>
+          <p:cNvPr id="4" name="Slide Number Placeholder 3"/>
+          <p:cNvSpPr>
+            <a:spLocks noGrp="1"/>
+          </p:cNvSpPr>
+          <p:nvPr>
+            <p:ph type="sldNum" sz="quarter" idx="5"/>
+          </p:nvPr>
+        </p:nvSpPr>
+        <p:spPr/>
+        <p:txBody>
+          <a:bodyPr/>
+          <a:lstStyle/>
+          <a:p>
+            <a:fld id="{28799E38-8F9F-49A5-A8CC-F4BFCC761885}" type="slidenum">
+              <a:rPr lang="en-US" smtClean="0"/>
+              <a:t>5</a:t>
+            </a:fld>
+            <a:endParaRPr lang="en-US"/>
+          </a:p>
+        </p:txBody>
+      </p:sp>
+    </p:spTree>
+    <p:extLst>
+      <p:ext uri="{BB962C8B-B14F-4D97-AF65-F5344CB8AC3E}">
+        <p14:creationId xmlns:p14="http://schemas.microsoft.com/office/powerpoint/2010/main" val="3141472333"/>
+      </p:ext>
+    </p:extLst>
+  </p:cSld>
+  <p:clrMapOvr>
+    <a:masterClrMapping/>
+  </p:clrMapOvr>
+</p:notes>
+</file>
+
+<file path=ppt/notesSlides/notesSlide2.xml><?xml version="1.0" encoding="utf-8"?>
+<p:notes xmlns:a="http://schemas.openxmlformats.org/drawingml/2006/main" xmlns:r="http://schemas.openxmlformats.org/officeDocument/2006/relationships" xmlns:p="http://schemas.openxmlformats.org/presentationml/2006/main">
+  <p:cSld>
+    <p:spTree>
+      <p:nvGrpSpPr>
+        <p:cNvPr id="1" name=""/>
+        <p:cNvGrpSpPr/>
+        <p:nvPr/>
+      </p:nvGrpSpPr>
+      <p:grpSpPr>
+        <a:xfrm>
+          <a:off x="0" y="0"/>
+          <a:ext cx="0" cy="0"/>
+          <a:chOff x="0" y="0"/>
+          <a:chExt cx="0" cy="0"/>
+        </a:xfrm>
+      </p:grpSpPr>
+      <p:sp>
+        <p:nvSpPr>
+          <p:cNvPr id="2" name="Slide Image Placeholder 1"/>
+          <p:cNvSpPr>
+            <a:spLocks noGrp="1" noRot="1" noChangeAspect="1"/>
+          </p:cNvSpPr>
+          <p:nvPr>
+            <p:ph type="sldImg"/>
+          </p:nvPr>
+        </p:nvSpPr>
+        <p:spPr/>
+      </p:sp>
+      <p:sp>
+        <p:nvSpPr>
+          <p:cNvPr id="3" name="Notes Placeholder 2"/>
+          <p:cNvSpPr>
+            <a:spLocks noGrp="1"/>
+          </p:cNvSpPr>
+          <p:nvPr>
+            <p:ph type="body" idx="1"/>
+          </p:nvPr>
+        </p:nvSpPr>
+        <p:spPr/>
+        <p:txBody>
+          <a:bodyPr/>
+          <a:lstStyle/>
+          <a:p>
+            <a:r>
+              <a:rPr lang="en-US"/>
+              <a:t>Jason</a:t>
+            </a:r>
+          </a:p>
+        </p:txBody>
+      </p:sp>
+      <p:sp>
+        <p:nvSpPr>
+          <p:cNvPr id="4" name="Slide Number Placeholder 3"/>
+          <p:cNvSpPr>
+            <a:spLocks noGrp="1"/>
+          </p:cNvSpPr>
+          <p:nvPr>
+            <p:ph type="sldNum" sz="quarter" idx="5"/>
+          </p:nvPr>
+        </p:nvSpPr>
+        <p:spPr/>
+        <p:txBody>
+          <a:bodyPr/>
+          <a:lstStyle/>
+          <a:p>
+            <a:fld id="{28799E38-8F9F-49A5-A8CC-F4BFCC761885}" type="slidenum">
+              <a:rPr lang="en-US" smtClean="0"/>
+              <a:t>5</a:t>
+            </a:fld>
+            <a:endParaRPr lang="en-US"/>
+          </a:p>
+        </p:txBody>
+      </p:sp>
+    </p:spTree>
+    <p:extLst>
+      <p:ext uri="{BB962C8B-B14F-4D97-AF65-F5344CB8AC3E}">
+        <p14:creationId xmlns:p14="http://schemas.microsoft.com/office/powerpoint/2010/main" val="83791397"/>
+      </p:ext>
+    </p:extLst>
+  </p:cSld>
+  <p:clrMapOvr>
+    <a:masterClrMapping/>
+  </p:clrMapOvr>
+</p:notes>
+</file>
+
+<file path=ppt/notesSlides/notesSlide3.xml><?xml version="1.0" encoding="utf-8"?>
+<p:notes xmlns:a="http://schemas.openxmlformats.org/drawingml/2006/main" xmlns:r="http://schemas.openxmlformats.org/officeDocument/2006/relationships" xmlns:p="http://schemas.openxmlformats.org/presentationml/2006/main">
+  <p:cSld>
+    <p:spTree>
+      <p:nvGrpSpPr>
+        <p:cNvPr id="1" name=""/>
+        <p:cNvGrpSpPr/>
+        <p:nvPr/>
+      </p:nvGrpSpPr>
+      <p:grpSpPr>
+        <a:xfrm>
+          <a:off x="0" y="0"/>
+          <a:ext cx="0" cy="0"/>
+          <a:chOff x="0" y="0"/>
+          <a:chExt cx="0" cy="0"/>
+        </a:xfrm>
+      </p:grpSpPr>
+      <p:sp>
+        <p:nvSpPr>
+          <p:cNvPr id="2" name="Slide Image Placeholder 1"/>
+          <p:cNvSpPr>
+            <a:spLocks noGrp="1" noRot="1" noChangeAspect="1"/>
+          </p:cNvSpPr>
+          <p:nvPr>
+            <p:ph type="sldImg"/>
+          </p:nvPr>
+        </p:nvSpPr>
+        <p:spPr/>
+      </p:sp>
+      <p:sp>
+        <p:nvSpPr>
+          <p:cNvPr id="3" name="Notes Placeholder 2"/>
+          <p:cNvSpPr>
+            <a:spLocks noGrp="1"/>
+          </p:cNvSpPr>
+          <p:nvPr>
+            <p:ph type="body" idx="1"/>
+          </p:nvPr>
+        </p:nvSpPr>
+        <p:spPr/>
+        <p:txBody>
+          <a:bodyPr/>
+          <a:lstStyle/>
+          <a:p>
+            <a:r>
+              <a:rPr lang="en-US"/>
+              <a:t>Tyler</a:t>
+            </a:r>
+          </a:p>
+        </p:txBody>
+      </p:sp>
+      <p:sp>
+        <p:nvSpPr>
+          <p:cNvPr id="4" name="Slide Number Placeholder 3"/>
+          <p:cNvSpPr>
+            <a:spLocks noGrp="1"/>
+          </p:cNvSpPr>
+          <p:nvPr>
+            <p:ph type="sldNum" sz="quarter" idx="5"/>
+          </p:nvPr>
+        </p:nvSpPr>
+        <p:spPr/>
+        <p:txBody>
+          <a:bodyPr/>
+          <a:lstStyle/>
+          <a:p>
+            <a:fld id="{28799E38-8F9F-49A5-A8CC-F4BFCC761885}" type="slidenum">
+              <a:rPr lang="en-US" smtClean="0"/>
+              <a:t>9</a:t>
+            </a:fld>
+            <a:endParaRPr lang="en-US"/>
+          </a:p>
+        </p:txBody>
+      </p:sp>
+    </p:spTree>
+    <p:extLst>
+      <p:ext uri="{BB962C8B-B14F-4D97-AF65-F5344CB8AC3E}">
+        <p14:creationId xmlns:p14="http://schemas.microsoft.com/office/powerpoint/2010/main" val="4040147688"/>
+      </p:ext>
+    </p:extLst>
+  </p:cSld>
+  <p:clrMapOvr>
+    <a:masterClrMapping/>
+  </p:clrMapOvr>
+</p:notes>
 </file>
 
 <file path=ppt/slideLayouts/slideLayout1.xml><?xml version="1.0" encoding="utf-8"?>
@@ -4116,7 +4358,7 @@
           <p:cNvPr id="2" name="Title 1">
             <a:extLst>
               <a:ext uri="{FF2B5EF4-FFF2-40B4-BE49-F238E27FC236}">
-                <a16:creationId xmlns:a16="http://schemas.microsoft.com/office/drawing/2014/main" id="{C4A6A181-F90D-09DC-4648-3204698C2221}"/>
+                <a16:creationId xmlns:a16="http://schemas.microsoft.com/office/drawing/2014/main" id="{6F54675D-A946-9AF2-4925-9C73477F4738}"/>
               </a:ext>
             </a:extLst>
           </p:cNvPr>
@@ -4133,56 +4375,49 @@
           <a:lstStyle/>
           <a:p>
             <a:r>
-              <a:rPr lang="en-US" b="0" i="0" dirty="0">
-                <a:effectLst/>
-                <a:latin typeface="Biome" panose="020B0503030204020804" pitchFamily="34" charset="0"/>
-                <a:cs typeface="Biome" panose="020B0503030204020804" pitchFamily="34" charset="0"/>
+              <a:rPr lang="en-US" dirty="0">
+                <a:latin typeface="Biome"/>
+                <a:cs typeface="Biome"/>
               </a:rPr>
-              <a:t>Lessons Learned</a:t>
-            </a:r>
-            <a:endParaRPr lang="en-US" dirty="0">
-              <a:latin typeface="Biome" panose="020B0503030204020804" pitchFamily="34" charset="0"/>
-              <a:cs typeface="Biome" panose="020B0503030204020804" pitchFamily="34" charset="0"/>
-            </a:endParaRPr>
-          </a:p>
-        </p:txBody>
-      </p:sp>
-      <p:sp>
-        <p:nvSpPr>
-          <p:cNvPr id="3" name="Content Placeholder 2">
+              <a:t>FUNCTIONALITY</a:t>
+            </a:r>
+            <a:endParaRPr lang="en-US" dirty="0"/>
+          </a:p>
+        </p:txBody>
+      </p:sp>
+      <p:pic>
+        <p:nvPicPr>
+          <p:cNvPr id="11" name="Content Placeholder 10">
             <a:extLst>
               <a:ext uri="{FF2B5EF4-FFF2-40B4-BE49-F238E27FC236}">
-                <a16:creationId xmlns:a16="http://schemas.microsoft.com/office/drawing/2014/main" id="{0526474C-B278-7BD0-DA99-052E71244BCA}"/>
+                <a16:creationId xmlns:a16="http://schemas.microsoft.com/office/drawing/2014/main" id="{BB821DD4-4A3A-B2A5-0C3C-E959AEEC27D6}"/>
               </a:ext>
             </a:extLst>
           </p:cNvPr>
-          <p:cNvSpPr>
-            <a:spLocks noGrp="1"/>
-          </p:cNvSpPr>
+          <p:cNvPicPr>
+            <a:picLocks noGrp="1" noChangeAspect="1"/>
+          </p:cNvPicPr>
           <p:nvPr>
             <p:ph idx="1"/>
           </p:nvPr>
-        </p:nvSpPr>
-        <p:spPr/>
-        <p:txBody>
-          <a:bodyPr/>
-          <a:lstStyle/>
-          <a:p>
-            <a:r>
-              <a:rPr lang="en-US" dirty="0">
-                <a:latin typeface="Biome" panose="020B0503030204020804" pitchFamily="34" charset="0"/>
-                <a:cs typeface="Biome" panose="020B0503030204020804" pitchFamily="34" charset="0"/>
-              </a:rPr>
-              <a:t>Explain the lessons learned</a:t>
-            </a:r>
-            <a:endParaRPr lang="en-US" dirty="0"/>
-          </a:p>
-        </p:txBody>
-      </p:sp>
+        </p:nvPicPr>
+        <p:blipFill>
+          <a:blip r:embed="rId2"/>
+          <a:stretch>
+            <a:fillRect/>
+          </a:stretch>
+        </p:blipFill>
+        <p:spPr>
+          <a:xfrm>
+            <a:off x="1279051" y="2526967"/>
+            <a:ext cx="9948333" cy="2301145"/>
+          </a:xfrm>
+        </p:spPr>
+      </p:pic>
     </p:spTree>
     <p:extLst>
       <p:ext uri="{BB962C8B-B14F-4D97-AF65-F5344CB8AC3E}">
-        <p14:creationId xmlns:p14="http://schemas.microsoft.com/office/powerpoint/2010/main" val="2288077047"/>
+        <p14:creationId xmlns:p14="http://schemas.microsoft.com/office/powerpoint/2010/main" val="3043180318"/>
       </p:ext>
     </p:extLst>
   </p:cSld>
@@ -4236,7 +4471,7 @@
                 <a:latin typeface="Biome" panose="020B0503030204020804" pitchFamily="34" charset="0"/>
                 <a:cs typeface="Biome" panose="020B0503030204020804" pitchFamily="34" charset="0"/>
               </a:rPr>
-              <a:t>Open Issues</a:t>
+              <a:t>Queries</a:t>
             </a:r>
             <a:endParaRPr lang="en-US" dirty="0">
               <a:latin typeface="Biome" panose="020B0503030204020804" pitchFamily="34" charset="0"/>
@@ -4268,11 +4503,349 @@
           <a:p>
             <a:r>
               <a:rPr lang="en-US" dirty="0">
+                <a:latin typeface="Biome"/>
+                <a:ea typeface="+mn-lt"/>
+                <a:cs typeface="+mn-lt"/>
+              </a:rPr>
+              <a:t>Suggestion Query</a:t>
+            </a:r>
+            <a:endParaRPr lang="en-US">
+              <a:latin typeface="Biome"/>
+              <a:cs typeface="Biome" panose="020B0503030204020804" pitchFamily="34" charset="0"/>
+            </a:endParaRPr>
+          </a:p>
+          <a:p>
+            <a:pPr lvl="1"/>
+            <a:r>
+              <a:rPr lang="en-US" dirty="0">
+                <a:latin typeface="Biome"/>
+                <a:ea typeface="+mn-lt"/>
+                <a:cs typeface="+mn-lt"/>
+              </a:rPr>
+              <a:t>This query uses Postgres, taking all the measurable features from a select song id, giving each of them a range, and finding songs that satisfy all of those ranges simultaneously</a:t>
+            </a:r>
+            <a:endParaRPr lang="en-US" dirty="0">
+              <a:latin typeface="Biome"/>
+            </a:endParaRPr>
+          </a:p>
+          <a:p>
+            <a:r>
+              <a:rPr lang="en-US">
+                <a:latin typeface="Biome"/>
+                <a:cs typeface="Biome"/>
+              </a:rPr>
+              <a:t>Songs from similar genre and artists</a:t>
+            </a:r>
+          </a:p>
+          <a:p>
+            <a:pPr lvl="1"/>
+            <a:r>
+              <a:rPr lang="en-US">
+                <a:latin typeface="Biome"/>
+                <a:cs typeface="Biome"/>
+              </a:rPr>
+              <a:t>This query uses Neo4j to recommend songs based a similar genre and overlapping artists.</a:t>
+            </a:r>
+          </a:p>
+        </p:txBody>
+      </p:sp>
+    </p:spTree>
+    <p:extLst>
+      <p:ext uri="{BB962C8B-B14F-4D97-AF65-F5344CB8AC3E}">
+        <p14:creationId xmlns:p14="http://schemas.microsoft.com/office/powerpoint/2010/main" val="591788664"/>
+      </p:ext>
+    </p:extLst>
+  </p:cSld>
+  <p:clrMapOvr>
+    <a:masterClrMapping/>
+  </p:clrMapOvr>
+</p:sld>
+</file>
+
+<file path=ppt/slides/slide12.xml><?xml version="1.0" encoding="utf-8"?>
+<p:sld xmlns:a="http://schemas.openxmlformats.org/drawingml/2006/main" xmlns:r="http://schemas.openxmlformats.org/officeDocument/2006/relationships" xmlns:p="http://schemas.openxmlformats.org/presentationml/2006/main">
+  <p:cSld>
+    <p:spTree>
+      <p:nvGrpSpPr>
+        <p:cNvPr id="1" name=""/>
+        <p:cNvGrpSpPr/>
+        <p:nvPr/>
+      </p:nvGrpSpPr>
+      <p:grpSpPr>
+        <a:xfrm>
+          <a:off x="0" y="0"/>
+          <a:ext cx="0" cy="0"/>
+          <a:chOff x="0" y="0"/>
+          <a:chExt cx="0" cy="0"/>
+        </a:xfrm>
+      </p:grpSpPr>
+      <p:sp>
+        <p:nvSpPr>
+          <p:cNvPr id="2" name="Title 1">
+            <a:extLst>
+              <a:ext uri="{FF2B5EF4-FFF2-40B4-BE49-F238E27FC236}">
+                <a16:creationId xmlns:a16="http://schemas.microsoft.com/office/drawing/2014/main" id="{C4A6A181-F90D-09DC-4648-3204698C2221}"/>
+              </a:ext>
+            </a:extLst>
+          </p:cNvPr>
+          <p:cNvSpPr>
+            <a:spLocks noGrp="1"/>
+          </p:cNvSpPr>
+          <p:nvPr>
+            <p:ph type="title"/>
+          </p:nvPr>
+        </p:nvSpPr>
+        <p:spPr/>
+        <p:txBody>
+          <a:bodyPr/>
+          <a:lstStyle/>
+          <a:p>
+            <a:r>
+              <a:rPr lang="en-US" b="0" i="0" dirty="0">
+                <a:effectLst/>
                 <a:latin typeface="Biome" panose="020B0503030204020804" pitchFamily="34" charset="0"/>
                 <a:cs typeface="Biome" panose="020B0503030204020804" pitchFamily="34" charset="0"/>
               </a:rPr>
-              <a:t>Explain future work</a:t>
-            </a:r>
+              <a:t>Lessons Learned</a:t>
+            </a:r>
+            <a:endParaRPr lang="en-US" dirty="0">
+              <a:latin typeface="Biome" panose="020B0503030204020804" pitchFamily="34" charset="0"/>
+              <a:cs typeface="Biome" panose="020B0503030204020804" pitchFamily="34" charset="0"/>
+            </a:endParaRPr>
+          </a:p>
+        </p:txBody>
+      </p:sp>
+      <p:sp>
+        <p:nvSpPr>
+          <p:cNvPr id="3" name="Content Placeholder 2">
+            <a:extLst>
+              <a:ext uri="{FF2B5EF4-FFF2-40B4-BE49-F238E27FC236}">
+                <a16:creationId xmlns:a16="http://schemas.microsoft.com/office/drawing/2014/main" id="{0526474C-B278-7BD0-DA99-052E71244BCA}"/>
+              </a:ext>
+            </a:extLst>
+          </p:cNvPr>
+          <p:cNvSpPr>
+            <a:spLocks noGrp="1"/>
+          </p:cNvSpPr>
+          <p:nvPr>
+            <p:ph idx="1"/>
+          </p:nvPr>
+        </p:nvSpPr>
+        <p:spPr/>
+        <p:txBody>
+          <a:bodyPr/>
+          <a:lstStyle/>
+          <a:p>
+            <a:r>
+              <a:rPr lang="en-US" dirty="0">
+                <a:latin typeface="Biome"/>
+                <a:cs typeface="Biome"/>
+              </a:rPr>
+              <a:t>Indexing is extremely useful in speeding up the process when querying databases with a lot of information</a:t>
+            </a:r>
+          </a:p>
+          <a:p>
+            <a:r>
+              <a:rPr lang="en-US" dirty="0">
+                <a:latin typeface="Biome"/>
+                <a:cs typeface="Biome"/>
+              </a:rPr>
+              <a:t>PostgreSQL and Neo4J thrive with different tasks</a:t>
+            </a:r>
+          </a:p>
+          <a:p>
+            <a:endParaRPr lang="en-US" dirty="0">
+              <a:latin typeface="Biome"/>
+              <a:cs typeface="Biome"/>
+            </a:endParaRPr>
+          </a:p>
+          <a:p>
+            <a:endParaRPr lang="en-US" dirty="0">
+              <a:latin typeface="Biome"/>
+              <a:cs typeface="Biome"/>
+            </a:endParaRPr>
+          </a:p>
+          <a:p>
+            <a:endParaRPr lang="en-US">
+              <a:latin typeface="Biome"/>
+              <a:cs typeface="Biome"/>
+            </a:endParaRPr>
+          </a:p>
+        </p:txBody>
+      </p:sp>
+    </p:spTree>
+    <p:extLst>
+      <p:ext uri="{BB962C8B-B14F-4D97-AF65-F5344CB8AC3E}">
+        <p14:creationId xmlns:p14="http://schemas.microsoft.com/office/powerpoint/2010/main" val="2288077047"/>
+      </p:ext>
+    </p:extLst>
+  </p:cSld>
+  <p:clrMapOvr>
+    <a:masterClrMapping/>
+  </p:clrMapOvr>
+</p:sld>
+</file>
+
+<file path=ppt/slides/slide13.xml><?xml version="1.0" encoding="utf-8"?>
+<p:sld xmlns:a="http://schemas.openxmlformats.org/drawingml/2006/main" xmlns:r="http://schemas.openxmlformats.org/officeDocument/2006/relationships" xmlns:p="http://schemas.openxmlformats.org/presentationml/2006/main">
+  <p:cSld>
+    <p:spTree>
+      <p:nvGrpSpPr>
+        <p:cNvPr id="1" name=""/>
+        <p:cNvGrpSpPr/>
+        <p:nvPr/>
+      </p:nvGrpSpPr>
+      <p:grpSpPr>
+        <a:xfrm>
+          <a:off x="0" y="0"/>
+          <a:ext cx="0" cy="0"/>
+          <a:chOff x="0" y="0"/>
+          <a:chExt cx="0" cy="0"/>
+        </a:xfrm>
+      </p:grpSpPr>
+      <p:sp>
+        <p:nvSpPr>
+          <p:cNvPr id="2" name="Title 1">
+            <a:extLst>
+              <a:ext uri="{FF2B5EF4-FFF2-40B4-BE49-F238E27FC236}">
+                <a16:creationId xmlns:a16="http://schemas.microsoft.com/office/drawing/2014/main" id="{C4A6A181-F90D-09DC-4648-3204698C2221}"/>
+              </a:ext>
+            </a:extLst>
+          </p:cNvPr>
+          <p:cNvSpPr>
+            <a:spLocks noGrp="1"/>
+          </p:cNvSpPr>
+          <p:nvPr>
+            <p:ph type="title"/>
+          </p:nvPr>
+        </p:nvSpPr>
+        <p:spPr/>
+        <p:txBody>
+          <a:bodyPr/>
+          <a:lstStyle/>
+          <a:p>
+            <a:r>
+              <a:rPr lang="en-US" b="0" i="0" dirty="0">
+                <a:effectLst/>
+                <a:latin typeface="Biome" panose="020B0503030204020804" pitchFamily="34" charset="0"/>
+                <a:cs typeface="Biome" panose="020B0503030204020804" pitchFamily="34" charset="0"/>
+              </a:rPr>
+              <a:t>Open Issues</a:t>
+            </a:r>
+            <a:endParaRPr lang="en-US" dirty="0">
+              <a:latin typeface="Biome" panose="020B0503030204020804" pitchFamily="34" charset="0"/>
+              <a:cs typeface="Biome" panose="020B0503030204020804" pitchFamily="34" charset="0"/>
+            </a:endParaRPr>
+          </a:p>
+        </p:txBody>
+      </p:sp>
+      <p:sp>
+        <p:nvSpPr>
+          <p:cNvPr id="3" name="Content Placeholder 2">
+            <a:extLst>
+              <a:ext uri="{FF2B5EF4-FFF2-40B4-BE49-F238E27FC236}">
+                <a16:creationId xmlns:a16="http://schemas.microsoft.com/office/drawing/2014/main" id="{0526474C-B278-7BD0-DA99-052E71244BCA}"/>
+              </a:ext>
+            </a:extLst>
+          </p:cNvPr>
+          <p:cNvSpPr>
+            <a:spLocks noGrp="1"/>
+          </p:cNvSpPr>
+          <p:nvPr>
+            <p:ph idx="1"/>
+          </p:nvPr>
+        </p:nvSpPr>
+        <p:spPr/>
+        <p:txBody>
+          <a:bodyPr>
+            <a:normAutofit fontScale="85000" lnSpcReduction="10000"/>
+          </a:bodyPr>
+          <a:lstStyle/>
+          <a:p>
+            <a:r>
+              <a:rPr lang="en-US" dirty="0">
+                <a:latin typeface="Biome"/>
+                <a:ea typeface="+mn-lt"/>
+                <a:cs typeface="+mn-lt"/>
+              </a:rPr>
+              <a:t>A new feature that could be added is song samples for recommended songs. A 15 second clip for users to listen to.</a:t>
+            </a:r>
+            <a:endParaRPr lang="en-US">
+              <a:latin typeface="Biome"/>
+              <a:ea typeface="+mn-lt"/>
+              <a:cs typeface="+mn-lt"/>
+            </a:endParaRPr>
+          </a:p>
+          <a:p>
+            <a:r>
+              <a:rPr lang="en-US" dirty="0">
+                <a:latin typeface="Biome"/>
+                <a:ea typeface="+mn-lt"/>
+                <a:cs typeface="+mn-lt"/>
+              </a:rPr>
+              <a:t>Limited user input and customization. Future work could incorporate more metrics such as time signature, key, mode etc. to better match with a user’s preferences.</a:t>
+            </a:r>
+            <a:endParaRPr lang="en-US" dirty="0">
+              <a:latin typeface="Biome"/>
+            </a:endParaRPr>
+          </a:p>
+          <a:p>
+            <a:r>
+              <a:rPr lang="en-US" dirty="0">
+                <a:latin typeface="Biome"/>
+                <a:cs typeface="Biome"/>
+              </a:rPr>
+              <a:t>With the dataset, they included the same song multiple times if it was used in more than one album, which gave some issues to our queries that go off title.</a:t>
+            </a:r>
+          </a:p>
+          <a:p>
+            <a:r>
+              <a:rPr lang="en-US" dirty="0">
+                <a:latin typeface="Biome"/>
+                <a:cs typeface="Biome"/>
+              </a:rPr>
+              <a:t>Performance</a:t>
+            </a:r>
+            <a:endParaRPr lang="en-US">
+              <a:latin typeface="Biome"/>
+              <a:cs typeface="Biome"/>
+            </a:endParaRPr>
+          </a:p>
+          <a:p>
+            <a:pPr lvl="1">
+              <a:buFont typeface="Courier New" panose="020B0604020202020204" pitchFamily="34" charset="0"/>
+              <a:buChar char="o"/>
+            </a:pPr>
+            <a:r>
+              <a:rPr lang="en-US" dirty="0">
+                <a:latin typeface="Biome"/>
+                <a:cs typeface="Biome"/>
+              </a:rPr>
+              <a:t>Small delay with real-time search</a:t>
+            </a:r>
+          </a:p>
+          <a:p>
+            <a:pPr lvl="1">
+              <a:buFont typeface="Courier New" panose="020B0604020202020204" pitchFamily="34" charset="0"/>
+              <a:buChar char="o"/>
+            </a:pPr>
+            <a:r>
+              <a:rPr lang="en-US" dirty="0">
+                <a:latin typeface="Biome"/>
+                <a:cs typeface="Biome"/>
+              </a:rPr>
+              <a:t>Delay with Neo4J query</a:t>
+            </a:r>
+          </a:p>
+          <a:p>
+            <a:pPr lvl="1">
+              <a:buFont typeface="Courier New" panose="020B0604020202020204" pitchFamily="34" charset="0"/>
+              <a:buChar char="o"/>
+            </a:pPr>
+            <a:endParaRPr lang="en-US" dirty="0">
+              <a:latin typeface="Biome"/>
+              <a:cs typeface="Biome"/>
+            </a:endParaRPr>
           </a:p>
         </p:txBody>
       </p:sp>
@@ -4360,18 +4933,47 @@
           <a:p>
             <a:r>
               <a:rPr lang="en-US" dirty="0" err="1">
-                <a:latin typeface="Biome" panose="020B0503030204020804" pitchFamily="34" charset="0"/>
-                <a:cs typeface="Biome" panose="020B0503030204020804" pitchFamily="34" charset="0"/>
+                <a:latin typeface="Biome"/>
+                <a:ea typeface="+mn-lt"/>
+                <a:cs typeface="+mn-lt"/>
               </a:rPr>
               <a:t>SongSuggest</a:t>
             </a:r>
             <a:r>
               <a:rPr lang="en-US" dirty="0">
-                <a:latin typeface="Biome" panose="020B0503030204020804" pitchFamily="34" charset="0"/>
-                <a:cs typeface="Biome" panose="020B0503030204020804" pitchFamily="34" charset="0"/>
+                <a:latin typeface="Biome"/>
+                <a:ea typeface="+mn-lt"/>
+                <a:cs typeface="+mn-lt"/>
               </a:rPr>
-              <a:t> is an application that looks at a dataset of songs to recommend new songs</a:t>
-            </a:r>
+              <a:t> is an application serves as a search engine for finding songs</a:t>
+            </a:r>
+            <a:endParaRPr lang="en-US">
+              <a:latin typeface="Gill Sans MT"/>
+              <a:ea typeface="+mn-lt"/>
+              <a:cs typeface="+mn-lt"/>
+            </a:endParaRPr>
+          </a:p>
+          <a:p>
+            <a:r>
+              <a:rPr lang="en-US" dirty="0">
+                <a:latin typeface="Biome"/>
+                <a:ea typeface="+mn-lt"/>
+                <a:cs typeface="+mn-lt"/>
+              </a:rPr>
+              <a:t>The application relates any specific song to other entries in the database by range of different variables</a:t>
+            </a:r>
+            <a:endParaRPr lang="en-US" dirty="0">
+              <a:latin typeface="Biome"/>
+            </a:endParaRPr>
+          </a:p>
+          <a:p>
+            <a:pPr marL="0" indent="0">
+              <a:buNone/>
+            </a:pPr>
+            <a:endParaRPr lang="en-US" dirty="0">
+              <a:latin typeface="Biome" panose="020B0503030204020804" pitchFamily="34" charset="0"/>
+              <a:cs typeface="Biome" panose="020B0503030204020804" pitchFamily="34" charset="0"/>
+            </a:endParaRPr>
           </a:p>
           <a:p>
             <a:endParaRPr lang="en-US" dirty="0">
@@ -4680,7 +5282,7 @@
     </p:spTree>
     <p:extLst>
       <p:ext uri="{BB962C8B-B14F-4D97-AF65-F5344CB8AC3E}">
-        <p14:creationId xmlns:p14="http://schemas.microsoft.com/office/powerpoint/2010/main" val="3043180318"/>
+        <p14:creationId xmlns:p14="http://schemas.microsoft.com/office/powerpoint/2010/main" val="47093671"/>
       </p:ext>
     </p:extLst>
   </p:cSld>
@@ -4766,20 +5368,108 @@
           <a:p>
             <a:r>
               <a:rPr lang="en-US" dirty="0">
-                <a:latin typeface="Biome" panose="020B0503030204020804" pitchFamily="34" charset="0"/>
-                <a:cs typeface="Biome" panose="020B0503030204020804" pitchFamily="34" charset="0"/>
+                <a:latin typeface="Biome"/>
+                <a:ea typeface="+mn-lt"/>
+                <a:cs typeface="+mn-lt"/>
               </a:rPr>
-              <a:t>A dataset of songs containing relevant song information such as artist names, track names, album names, </a:t>
-            </a:r>
+              <a:t>A dataset of songs containing relevant song information such as artist name, the album it belongs to</a:t>
+            </a:r>
+            <a:endParaRPr lang="en-US" dirty="0">
+              <a:latin typeface="Biome"/>
+              <a:cs typeface="Biome"/>
+            </a:endParaRPr>
           </a:p>
           <a:p>
             <a:r>
               <a:rPr lang="en-US" dirty="0">
-                <a:latin typeface="Biome" panose="020B0503030204020804" pitchFamily="34" charset="0"/>
-                <a:cs typeface="Biome" panose="020B0503030204020804" pitchFamily="34" charset="0"/>
+                <a:latin typeface="Biome"/>
+                <a:ea typeface="+mn-lt"/>
+                <a:cs typeface="+mn-lt"/>
               </a:rPr>
-              <a:t>A total of 114,000 entries</a:t>
-            </a:r>
+              <a:t>It also comes with other descriptive attributes such as</a:t>
+            </a:r>
+            <a:endParaRPr lang="en-US">
+              <a:latin typeface="Biome"/>
+              <a:cs typeface="Biome"/>
+            </a:endParaRPr>
+          </a:p>
+          <a:p>
+            <a:pPr lvl="1"/>
+            <a:r>
+              <a:rPr lang="en-US" dirty="0">
+                <a:latin typeface="Biome"/>
+                <a:ea typeface="+mn-lt"/>
+                <a:cs typeface="+mn-lt"/>
+              </a:rPr>
+              <a:t>Popularity, duration, danceability, energy, loudness, </a:t>
+            </a:r>
+            <a:r>
+              <a:rPr lang="en-US" err="1">
+                <a:latin typeface="Biome"/>
+                <a:ea typeface="+mn-lt"/>
+                <a:cs typeface="+mn-lt"/>
+              </a:rPr>
+              <a:t>speechiness</a:t>
+            </a:r>
+            <a:r>
+              <a:rPr lang="en-US" dirty="0">
+                <a:latin typeface="Biome"/>
+                <a:ea typeface="+mn-lt"/>
+                <a:cs typeface="+mn-lt"/>
+              </a:rPr>
+              <a:t>, </a:t>
+            </a:r>
+            <a:r>
+              <a:rPr lang="en-US" err="1">
+                <a:latin typeface="Biome"/>
+                <a:ea typeface="+mn-lt"/>
+                <a:cs typeface="+mn-lt"/>
+              </a:rPr>
+              <a:t>acousticness</a:t>
+            </a:r>
+            <a:r>
+              <a:rPr lang="en-US" dirty="0">
+                <a:latin typeface="Biome"/>
+                <a:ea typeface="+mn-lt"/>
+                <a:cs typeface="+mn-lt"/>
+              </a:rPr>
+              <a:t>, </a:t>
+            </a:r>
+            <a:r>
+              <a:rPr lang="en-US" err="1">
+                <a:latin typeface="Biome"/>
+                <a:ea typeface="+mn-lt"/>
+                <a:cs typeface="+mn-lt"/>
+              </a:rPr>
+              <a:t>instrumentalness</a:t>
+            </a:r>
+            <a:r>
+              <a:rPr lang="en-US" dirty="0">
+                <a:latin typeface="Biome"/>
+                <a:ea typeface="+mn-lt"/>
+                <a:cs typeface="+mn-lt"/>
+              </a:rPr>
+              <a:t>, liveness, valence, tempo, and the genre.</a:t>
+            </a:r>
+            <a:endParaRPr lang="en-US" dirty="0">
+              <a:latin typeface="Biome"/>
+              <a:ea typeface="+mn-lt"/>
+              <a:cs typeface="Biome"/>
+            </a:endParaRPr>
+          </a:p>
+          <a:p>
+            <a:r>
+              <a:rPr lang="en-US" dirty="0">
+                <a:latin typeface="Biome"/>
+                <a:ea typeface="+mn-lt"/>
+                <a:cs typeface="+mn-lt"/>
+              </a:rPr>
+              <a:t>A total of 114,000 entries x 21 columns</a:t>
+            </a:r>
+            <a:endParaRPr lang="en-US" dirty="0">
+              <a:latin typeface="Biome"/>
+              <a:cs typeface="Biome"/>
+            </a:endParaRPr>
           </a:p>
           <a:p>
             <a:endParaRPr lang="en-US" dirty="0">
@@ -4789,6 +5479,57 @@
           </a:p>
           <a:p>
             <a:endParaRPr lang="en-US" dirty="0"/>
+          </a:p>
+        </p:txBody>
+      </p:sp>
+      <p:sp>
+        <p:nvSpPr>
+          <p:cNvPr id="5" name="TextBox 4">
+            <a:extLst>
+              <a:ext uri="{FF2B5EF4-FFF2-40B4-BE49-F238E27FC236}">
+                <a16:creationId xmlns:a16="http://schemas.microsoft.com/office/drawing/2014/main" id="{97093804-DA3B-4DD1-C449-5EC021272AAC}"/>
+              </a:ext>
+            </a:extLst>
+          </p:cNvPr>
+          <p:cNvSpPr txBox="1"/>
+          <p:nvPr/>
+        </p:nvSpPr>
+        <p:spPr>
+          <a:xfrm>
+            <a:off x="0" y="5840490"/>
+            <a:ext cx="6327648" cy="276999"/>
+          </a:xfrm>
+          <a:prstGeom prst="rect">
+            <a:avLst/>
+          </a:prstGeom>
+          <a:noFill/>
+        </p:spPr>
+        <p:txBody>
+          <a:bodyPr wrap="square">
+            <a:spAutoFit/>
+          </a:bodyPr>
+          <a:lstStyle/>
+          <a:p>
+            <a:r>
+              <a:rPr lang="en-US" sz="1200"/>
+              <a:t>Dataset via Kaggle:  Pandya, Maharshi, Spotify Tracks Dataset, DOI:10.34740/</a:t>
+            </a:r>
+            <a:r>
+              <a:rPr lang="en-US" sz="1200" err="1"/>
+              <a:t>kaggle</a:t>
+            </a:r>
+            <a:r>
+              <a:rPr lang="en-US" sz="1200"/>
+              <a:t>/</a:t>
+            </a:r>
+            <a:r>
+              <a:rPr lang="en-US" sz="1200" err="1"/>
+              <a:t>dsv</a:t>
+            </a:r>
+            <a:r>
+              <a:rPr lang="en-US" sz="1200"/>
+              <a:t>/4372070</a:t>
+            </a:r>
           </a:p>
         </p:txBody>
       </p:sp>
@@ -4876,26 +5617,155 @@
         </p:nvSpPr>
         <p:spPr/>
         <p:txBody>
-          <a:bodyPr/>
+          <a:bodyPr>
+            <a:normAutofit lnSpcReduction="10000"/>
+          </a:bodyPr>
           <a:lstStyle/>
           <a:p>
             <a:r>
               <a:rPr lang="en-US" dirty="0">
-                <a:latin typeface="Biome" panose="020B0503030204020804" pitchFamily="34" charset="0"/>
-                <a:cs typeface="Biome" panose="020B0503030204020804" pitchFamily="34" charset="0"/>
+                <a:latin typeface="Biome"/>
+                <a:ea typeface="+mn-lt"/>
+                <a:cs typeface="+mn-lt"/>
               </a:rPr>
-              <a:t>Postgres - *explain why here*</a:t>
-            </a:r>
-          </a:p>
-          <a:p>
+              <a:t>PostgreSQL</a:t>
+            </a:r>
+            <a:endParaRPr lang="en-US" dirty="0">
+              <a:latin typeface="Biome"/>
+              <a:ea typeface="+mn-lt"/>
+              <a:cs typeface="Biome" panose="020B0503030204020804" pitchFamily="34" charset="0"/>
+            </a:endParaRPr>
+          </a:p>
+          <a:p>
+            <a:pPr lvl="1">
+              <a:buFont typeface="Courier New" panose="020B0604020202020204" pitchFamily="34" charset="0"/>
+              <a:buChar char="o"/>
+            </a:pPr>
             <a:r>
               <a:rPr lang="en-US" dirty="0">
-                <a:latin typeface="Biome" panose="020B0503030204020804" pitchFamily="34" charset="0"/>
-                <a:cs typeface="Biome" panose="020B0503030204020804" pitchFamily="34" charset="0"/>
+                <a:latin typeface="Biome"/>
+                <a:ea typeface="+mn-lt"/>
+                <a:cs typeface="+mn-lt"/>
               </a:rPr>
-              <a:t>Neo4J - *explain why here*</a:t>
-            </a:r>
-            <a:endParaRPr lang="en-US" dirty="0"/>
+              <a:t>Familiarity</a:t>
+            </a:r>
+          </a:p>
+          <a:p>
+            <a:pPr lvl="1">
+              <a:buFont typeface="Courier New" panose="020B0604020202020204" pitchFamily="34" charset="0"/>
+              <a:buChar char="o"/>
+            </a:pPr>
+            <a:r>
+              <a:rPr lang="en-US" dirty="0">
+                <a:latin typeface="Biome"/>
+                <a:ea typeface="+mn-lt"/>
+                <a:cs typeface="+mn-lt"/>
+              </a:rPr>
+              <a:t>Data consistency and integrity</a:t>
+            </a:r>
+          </a:p>
+          <a:p>
+            <a:pPr lvl="1">
+              <a:buFont typeface="Courier New" panose="020B0604020202020204" pitchFamily="34" charset="0"/>
+              <a:buChar char="o"/>
+            </a:pPr>
+            <a:r>
+              <a:rPr lang="en-US" dirty="0">
+                <a:latin typeface="Biome"/>
+                <a:ea typeface="+mn-lt"/>
+                <a:cs typeface="+mn-lt"/>
+              </a:rPr>
+              <a:t>Larger dataset </a:t>
+            </a:r>
+            <a:endParaRPr lang="en-US" dirty="0">
+              <a:latin typeface="Biome"/>
+              <a:ea typeface="+mn-lt"/>
+              <a:cs typeface="Biome" panose="020B0503030204020804" pitchFamily="34" charset="0"/>
+            </a:endParaRPr>
+          </a:p>
+          <a:p>
+            <a:pPr lvl="2">
+              <a:buFont typeface="Wingdings" panose="020B0604020202020204" pitchFamily="34" charset="0"/>
+              <a:buChar char="§"/>
+            </a:pPr>
+            <a:r>
+              <a:rPr lang="en-US" dirty="0">
+                <a:latin typeface="Biome"/>
+                <a:ea typeface="+mn-lt"/>
+                <a:cs typeface="+mn-lt"/>
+              </a:rPr>
+              <a:t>Horizontally taxing to the database</a:t>
+            </a:r>
+            <a:endParaRPr lang="en-US" dirty="0">
+              <a:latin typeface="Biome"/>
+              <a:cs typeface="Biome" panose="020B0503030204020804" pitchFamily="34" charset="0"/>
+            </a:endParaRPr>
+          </a:p>
+          <a:p>
+            <a:r>
+              <a:rPr lang="en-US" dirty="0">
+                <a:latin typeface="Biome"/>
+                <a:ea typeface="+mn-lt"/>
+                <a:cs typeface="+mn-lt"/>
+              </a:rPr>
+              <a:t>Neo4J </a:t>
+            </a:r>
+            <a:endParaRPr lang="en-US" dirty="0">
+              <a:latin typeface="Biome"/>
+              <a:ea typeface="+mn-lt"/>
+              <a:cs typeface="Biome"/>
+            </a:endParaRPr>
+          </a:p>
+          <a:p>
+            <a:pPr lvl="1">
+              <a:buFont typeface="Courier New" panose="020B0604020202020204" pitchFamily="34" charset="0"/>
+              <a:buChar char="o"/>
+            </a:pPr>
+            <a:r>
+              <a:rPr lang="en-US" dirty="0">
+                <a:latin typeface="Biome"/>
+                <a:ea typeface="+mn-lt"/>
+                <a:cs typeface="+mn-lt"/>
+              </a:rPr>
+              <a:t>Relational capabilities</a:t>
+            </a:r>
+            <a:endParaRPr lang="en-US">
+              <a:latin typeface="Biome"/>
+              <a:ea typeface="+mn-lt"/>
+              <a:cs typeface="Biome"/>
+            </a:endParaRPr>
+          </a:p>
+          <a:p>
+            <a:pPr lvl="1">
+              <a:buFont typeface="Courier New" panose="020B0604020202020204" pitchFamily="34" charset="0"/>
+              <a:buChar char="o"/>
+            </a:pPr>
+            <a:r>
+              <a:rPr lang="en-US" dirty="0">
+                <a:latin typeface="Biome"/>
+                <a:cs typeface="Biome"/>
+              </a:rPr>
+              <a:t>Relating different data from dataset</a:t>
+            </a:r>
+          </a:p>
+          <a:p>
+            <a:pPr lvl="2">
+              <a:buFont typeface="Wingdings" panose="020B0604020202020204" pitchFamily="34" charset="0"/>
+              <a:buChar char="§"/>
+            </a:pPr>
+            <a:r>
+              <a:rPr lang="en-US" dirty="0">
+                <a:latin typeface="Biome"/>
+                <a:cs typeface="Biome"/>
+              </a:rPr>
+              <a:t>Artists, Songs, Albums, Genre – A lot of potential relations </a:t>
+            </a:r>
+          </a:p>
+          <a:p>
+            <a:endParaRPr lang="en-US" dirty="0">
+              <a:latin typeface="Biome"/>
+              <a:cs typeface="Biome"/>
+            </a:endParaRPr>
           </a:p>
         </p:txBody>
       </p:sp>
@@ -4960,44 +5830,151 @@
           </a:p>
         </p:txBody>
       </p:sp>
-      <p:sp>
-        <p:nvSpPr>
-          <p:cNvPr id="3" name="Content Placeholder 2">
+      <p:pic>
+        <p:nvPicPr>
+          <p:cNvPr id="5" name="Content Placeholder 4" descr="A group of colorful rectangular boxes with text&#10;&#10;Description automatically generated">
             <a:extLst>
               <a:ext uri="{FF2B5EF4-FFF2-40B4-BE49-F238E27FC236}">
-                <a16:creationId xmlns:a16="http://schemas.microsoft.com/office/drawing/2014/main" id="{0526474C-B278-7BD0-DA99-052E71244BCA}"/>
+                <a16:creationId xmlns:a16="http://schemas.microsoft.com/office/drawing/2014/main" id="{601A0207-B610-38B5-73DA-28C118ED562E}"/>
               </a:ext>
             </a:extLst>
           </p:cNvPr>
-          <p:cNvSpPr>
-            <a:spLocks noGrp="1"/>
-          </p:cNvSpPr>
+          <p:cNvPicPr>
+            <a:picLocks noGrp="1" noChangeAspect="1"/>
+          </p:cNvPicPr>
           <p:nvPr>
             <p:ph idx="1"/>
           </p:nvPr>
-        </p:nvSpPr>
-        <p:spPr/>
-        <p:txBody>
-          <a:bodyPr/>
+        </p:nvPicPr>
+        <p:blipFill>
+          <a:blip r:embed="rId2"/>
+          <a:stretch>
+            <a:fillRect/>
+          </a:stretch>
+        </p:blipFill>
+        <p:spPr>
+          <a:xfrm>
+            <a:off x="2175105" y="2896382"/>
+            <a:ext cx="8085666" cy="2973427"/>
+          </a:xfrm>
+        </p:spPr>
+      </p:pic>
+      <p:sp>
+        <p:nvSpPr>
+          <p:cNvPr id="7" name="TextBox 6">
+            <a:extLst>
+              <a:ext uri="{FF2B5EF4-FFF2-40B4-BE49-F238E27FC236}">
+                <a16:creationId xmlns:a16="http://schemas.microsoft.com/office/drawing/2014/main" id="{E30CEB0F-199F-2180-A83A-FFFACC518448}"/>
+              </a:ext>
+            </a:extLst>
+          </p:cNvPr>
+          <p:cNvSpPr txBox="1"/>
+          <p:nvPr/>
+        </p:nvSpPr>
+        <p:spPr>
+          <a:xfrm>
+            <a:off x="2176643" y="2894110"/>
+            <a:ext cx="1487184" cy="369332"/>
+          </a:xfrm>
+          <a:prstGeom prst="rect">
+            <a:avLst/>
+          </a:prstGeom>
+          <a:noFill/>
+        </p:spPr>
+        <p:txBody>
+          <a:bodyPr wrap="square" lIns="91440" tIns="45720" rIns="91440" bIns="45720" anchor="t">
+            <a:spAutoFit/>
+          </a:bodyPr>
           <a:lstStyle/>
           <a:p>
             <a:r>
               <a:rPr lang="en-US" dirty="0">
-                <a:latin typeface="Biome" panose="020B0503030204020804" pitchFamily="34" charset="0"/>
-                <a:cs typeface="Biome" panose="020B0503030204020804" pitchFamily="34" charset="0"/>
+                <a:latin typeface="Biome"/>
+                <a:cs typeface="Biome"/>
               </a:rPr>
-              <a:t>Perhaps show diagram of how database is structured</a:t>
-            </a:r>
-          </a:p>
+              <a:t>Neo4J</a:t>
+            </a:r>
+            <a:endParaRPr lang="en-US" dirty="0">
+              <a:latin typeface="Biome" panose="020B0503030204020804" pitchFamily="34" charset="0"/>
+              <a:cs typeface="Biome" panose="020B0503030204020804" pitchFamily="34" charset="0"/>
+            </a:endParaRPr>
+          </a:p>
+        </p:txBody>
+      </p:sp>
+      <p:sp>
+        <p:nvSpPr>
+          <p:cNvPr id="8" name="TextBox 7">
+            <a:extLst>
+              <a:ext uri="{FF2B5EF4-FFF2-40B4-BE49-F238E27FC236}">
+                <a16:creationId xmlns:a16="http://schemas.microsoft.com/office/drawing/2014/main" id="{6CD5023C-584E-0EFF-C6E8-3822063CF225}"/>
+              </a:ext>
+            </a:extLst>
+          </p:cNvPr>
+          <p:cNvSpPr txBox="1"/>
+          <p:nvPr/>
+        </p:nvSpPr>
+        <p:spPr>
+          <a:xfrm>
+            <a:off x="2176643" y="2054499"/>
+            <a:ext cx="1762350" cy="369332"/>
+          </a:xfrm>
+          <a:prstGeom prst="rect">
+            <a:avLst/>
+          </a:prstGeom>
+          <a:noFill/>
+        </p:spPr>
+        <p:txBody>
+          <a:bodyPr wrap="square" lIns="91440" tIns="45720" rIns="91440" bIns="45720" anchor="t">
+            <a:spAutoFit/>
+          </a:bodyPr>
+          <a:lstStyle/>
           <a:p>
             <a:r>
               <a:rPr lang="en-US" dirty="0">
-                <a:latin typeface="Biome" panose="020B0503030204020804" pitchFamily="34" charset="0"/>
-                <a:cs typeface="Biome" panose="020B0503030204020804" pitchFamily="34" charset="0"/>
+                <a:latin typeface="Biome"/>
+                <a:cs typeface="Biome"/>
               </a:rPr>
-              <a:t>Explain if and why indexes are used</a:t>
+              <a:t>PostgreSQL</a:t>
             </a:r>
             <a:endParaRPr lang="en-US" dirty="0"/>
+          </a:p>
+        </p:txBody>
+      </p:sp>
+      <p:sp>
+        <p:nvSpPr>
+          <p:cNvPr id="11" name="TextBox 10">
+            <a:extLst>
+              <a:ext uri="{FF2B5EF4-FFF2-40B4-BE49-F238E27FC236}">
+                <a16:creationId xmlns:a16="http://schemas.microsoft.com/office/drawing/2014/main" id="{19033585-B57B-5C83-CE74-DE70C2F0BA01}"/>
+              </a:ext>
+            </a:extLst>
+          </p:cNvPr>
+          <p:cNvSpPr txBox="1"/>
+          <p:nvPr/>
+        </p:nvSpPr>
+        <p:spPr>
+          <a:xfrm>
+            <a:off x="2621143" y="2400221"/>
+            <a:ext cx="8486292" cy="276999"/>
+          </a:xfrm>
+          <a:prstGeom prst="rect">
+            <a:avLst/>
+          </a:prstGeom>
+          <a:noFill/>
+        </p:spPr>
+        <p:txBody>
+          <a:bodyPr wrap="square" lIns="91440" tIns="45720" rIns="91440" bIns="45720" anchor="t">
+            <a:spAutoFit/>
+          </a:bodyPr>
+          <a:lstStyle/>
+          <a:p>
+            <a:r>
+              <a:rPr lang="en-US" sz="1200" dirty="0">
+                <a:latin typeface="Biome"/>
+                <a:cs typeface="Biome"/>
+              </a:rPr>
+              <a:t>Column separated properties; normalization did not necessarily make sense with the data worked with</a:t>
+            </a:r>
           </a:p>
         </p:txBody>
       </p:sp>
@@ -5036,7 +6013,7 @@
           <p:cNvPr id="2" name="Title 1">
             <a:extLst>
               <a:ext uri="{FF2B5EF4-FFF2-40B4-BE49-F238E27FC236}">
-                <a16:creationId xmlns:a16="http://schemas.microsoft.com/office/drawing/2014/main" id="{C4A6A181-F90D-09DC-4648-3204698C2221}"/>
+                <a16:creationId xmlns:a16="http://schemas.microsoft.com/office/drawing/2014/main" id="{B4171D74-1D78-FF63-7432-92F5F830A23B}"/>
               </a:ext>
             </a:extLst>
           </p:cNvPr>
@@ -5053,69 +6030,243 @@
           <a:lstStyle/>
           <a:p>
             <a:r>
-              <a:rPr lang="en-US" dirty="0">
-                <a:latin typeface="Biome" panose="020B0503030204020804" pitchFamily="34" charset="0"/>
-                <a:cs typeface="Biome" panose="020B0503030204020804" pitchFamily="34" charset="0"/>
-              </a:rPr>
-              <a:t>Tools USED</a:t>
-            </a:r>
-          </a:p>
-        </p:txBody>
-      </p:sp>
-      <p:sp>
-        <p:nvSpPr>
-          <p:cNvPr id="3" name="Content Placeholder 2">
+              <a:rPr lang="en-US"/>
+              <a:t>Db schema/structure</a:t>
+            </a:r>
+          </a:p>
+        </p:txBody>
+      </p:sp>
+      <p:pic>
+        <p:nvPicPr>
+          <p:cNvPr id="4" name="Picture 3" descr="A spiral of circles and dots&#10;&#10;Description automatically generated">
             <a:extLst>
               <a:ext uri="{FF2B5EF4-FFF2-40B4-BE49-F238E27FC236}">
-                <a16:creationId xmlns:a16="http://schemas.microsoft.com/office/drawing/2014/main" id="{0526474C-B278-7BD0-DA99-052E71244BCA}"/>
+                <a16:creationId xmlns:a16="http://schemas.microsoft.com/office/drawing/2014/main" id="{B79DF86E-CAA1-202B-904C-05F0B4DB72DA}"/>
               </a:ext>
             </a:extLst>
           </p:cNvPr>
-          <p:cNvSpPr>
-            <a:spLocks noGrp="1"/>
-          </p:cNvSpPr>
-          <p:nvPr>
-            <p:ph idx="1"/>
-          </p:nvPr>
-        </p:nvSpPr>
-        <p:spPr/>
-        <p:txBody>
-          <a:bodyPr/>
-          <a:lstStyle/>
-          <a:p>
-            <a:r>
-              <a:rPr lang="en-US" dirty="0">
-                <a:latin typeface="Biome" panose="020B0503030204020804" pitchFamily="34" charset="0"/>
-                <a:cs typeface="Biome" panose="020B0503030204020804" pitchFamily="34" charset="0"/>
+          <p:cNvPicPr>
+            <a:picLocks noChangeAspect="1"/>
+          </p:cNvPicPr>
+          <p:nvPr/>
+        </p:nvPicPr>
+        <p:blipFill rotWithShape="1">
+          <a:blip r:embed="rId2">
+            <a:extLst>
+              <a:ext uri="{28A0092B-C50C-407E-A947-70E740481C1C}">
+                <a14:useLocalDpi xmlns:a14="http://schemas.microsoft.com/office/drawing/2010/main" val="0"/>
+              </a:ext>
+            </a:extLst>
+          </a:blip>
+          <a:srcRect l="16911" t="21468" r="33477" b="27268"/>
+          <a:stretch/>
+        </p:blipFill>
+        <p:spPr>
+          <a:xfrm>
+            <a:off x="4563331" y="2926922"/>
+            <a:ext cx="3065337" cy="3093328"/>
+          </a:xfrm>
+          <a:prstGeom prst="rect">
+            <a:avLst/>
+          </a:prstGeom>
+          <a:ln w="28575">
+            <a:solidFill>
+              <a:schemeClr val="tx1"/>
+            </a:solidFill>
+          </a:ln>
+        </p:spPr>
+      </p:pic>
+      <p:pic>
+        <p:nvPicPr>
+          <p:cNvPr id="5" name="Picture 4" descr="A diagram of a song&#10;&#10;Description automatically generated">
+            <a:extLst>
+              <a:ext uri="{FF2B5EF4-FFF2-40B4-BE49-F238E27FC236}">
+                <a16:creationId xmlns:a16="http://schemas.microsoft.com/office/drawing/2014/main" id="{6EF7A204-69F6-C1CE-BE5B-0BB1109EF950}"/>
+              </a:ext>
+            </a:extLst>
+          </p:cNvPr>
+          <p:cNvPicPr>
+            <a:picLocks noChangeAspect="1"/>
+          </p:cNvPicPr>
+          <p:nvPr/>
+        </p:nvPicPr>
+        <p:blipFill>
+          <a:blip r:embed="rId3">
+            <a:extLst>
+              <a:ext uri="{28A0092B-C50C-407E-A947-70E740481C1C}">
+                <a14:useLocalDpi xmlns:a14="http://schemas.microsoft.com/office/drawing/2010/main" val="0"/>
+              </a:ext>
+            </a:extLst>
+          </a:blip>
+          <a:stretch>
+            <a:fillRect/>
+          </a:stretch>
+        </p:blipFill>
+        <p:spPr>
+          <a:xfrm>
+            <a:off x="242348" y="2850677"/>
+            <a:ext cx="3376464" cy="3169573"/>
+          </a:xfrm>
+          <a:prstGeom prst="rect">
+            <a:avLst/>
+          </a:prstGeom>
+          <a:ln w="28575">
+            <a:solidFill>
+              <a:schemeClr val="tx1"/>
+            </a:solidFill>
+          </a:ln>
+        </p:spPr>
+      </p:pic>
+      <p:pic>
+        <p:nvPicPr>
+          <p:cNvPr id="6" name="Picture 5" descr="A black background with white circles&#10;&#10;Description automatically generated">
+            <a:extLst>
+              <a:ext uri="{FF2B5EF4-FFF2-40B4-BE49-F238E27FC236}">
+                <a16:creationId xmlns:a16="http://schemas.microsoft.com/office/drawing/2014/main" id="{F14F77A0-694A-424B-0C58-CEAA26103B56}"/>
+              </a:ext>
+            </a:extLst>
+          </p:cNvPr>
+          <p:cNvPicPr>
+            <a:picLocks noChangeAspect="1"/>
+          </p:cNvPicPr>
+          <p:nvPr/>
+        </p:nvPicPr>
+        <p:blipFill rotWithShape="1">
+          <a:blip r:embed="rId4">
+            <a:extLst>
+              <a:ext uri="{28A0092B-C50C-407E-A947-70E740481C1C}">
+                <a14:useLocalDpi xmlns:a14="http://schemas.microsoft.com/office/drawing/2010/main" val="0"/>
+              </a:ext>
+            </a:extLst>
+          </a:blip>
+          <a:srcRect l="13478" t="15537" r="24826" b="20979"/>
+          <a:stretch/>
+        </p:blipFill>
+        <p:spPr>
+          <a:xfrm>
+            <a:off x="8951506" y="2895842"/>
+            <a:ext cx="2905600" cy="3079242"/>
+          </a:xfrm>
+          <a:prstGeom prst="rect">
+            <a:avLst/>
+          </a:prstGeom>
+          <a:ln w="28575">
+            <a:solidFill>
+              <a:schemeClr val="tx1"/>
+            </a:solidFill>
+          </a:ln>
+        </p:spPr>
+      </p:pic>
+      <p:sp>
+        <p:nvSpPr>
+          <p:cNvPr id="7" name="TextBox 6">
+            <a:extLst>
+              <a:ext uri="{FF2B5EF4-FFF2-40B4-BE49-F238E27FC236}">
+                <a16:creationId xmlns:a16="http://schemas.microsoft.com/office/drawing/2014/main" id="{4818430A-DB9E-9E19-342A-9D78065B37B5}"/>
+              </a:ext>
+            </a:extLst>
+          </p:cNvPr>
+          <p:cNvSpPr txBox="1"/>
+          <p:nvPr/>
+        </p:nvSpPr>
+        <p:spPr>
+          <a:xfrm>
+            <a:off x="242348" y="2170774"/>
+            <a:ext cx="3298682" cy="646331"/>
+          </a:xfrm>
+          <a:prstGeom prst="rect">
+            <a:avLst/>
+          </a:prstGeom>
+          <a:noFill/>
+        </p:spPr>
+        <p:txBody>
+          <a:bodyPr wrap="square" lIns="91440" tIns="45720" rIns="91440" bIns="45720" rtlCol="0" anchor="t">
+            <a:spAutoFit/>
+          </a:bodyPr>
+          <a:lstStyle/>
+          <a:p>
+            <a:r>
+              <a:rPr lang="en-US">
+                <a:latin typeface="Biome"/>
+                <a:cs typeface="Biome"/>
               </a:rPr>
-              <a:t>Python as the programming language</a:t>
-            </a:r>
-          </a:p>
-          <a:p>
-            <a:r>
-              <a:rPr lang="en-US" dirty="0">
-                <a:latin typeface="Biome" panose="020B0503030204020804" pitchFamily="34" charset="0"/>
-                <a:cs typeface="Biome" panose="020B0503030204020804" pitchFamily="34" charset="0"/>
+              <a:t>(:Songs)–[:IN_GENRE]-(:Genre)</a:t>
+            </a:r>
+          </a:p>
+        </p:txBody>
+      </p:sp>
+      <p:sp>
+        <p:nvSpPr>
+          <p:cNvPr id="8" name="TextBox 7">
+            <a:extLst>
+              <a:ext uri="{FF2B5EF4-FFF2-40B4-BE49-F238E27FC236}">
+                <a16:creationId xmlns:a16="http://schemas.microsoft.com/office/drawing/2014/main" id="{39D79684-4791-4E3C-CF63-8C7F080A0374}"/>
+              </a:ext>
+            </a:extLst>
+          </p:cNvPr>
+          <p:cNvSpPr txBox="1"/>
+          <p:nvPr/>
+        </p:nvSpPr>
+        <p:spPr>
+          <a:xfrm>
+            <a:off x="4413469" y="1940052"/>
+            <a:ext cx="3735785" cy="923330"/>
+          </a:xfrm>
+          <a:prstGeom prst="rect">
+            <a:avLst/>
+          </a:prstGeom>
+          <a:noFill/>
+        </p:spPr>
+        <p:txBody>
+          <a:bodyPr wrap="square" lIns="91440" tIns="45720" rIns="91440" bIns="45720" rtlCol="0" anchor="t">
+            <a:spAutoFit/>
+          </a:bodyPr>
+          <a:lstStyle/>
+          <a:p>
+            <a:r>
+              <a:rPr lang="en-US">
+                <a:latin typeface="Biome"/>
+                <a:cs typeface="Biome"/>
               </a:rPr>
-              <a:t>Flask for the WEB framework</a:t>
-            </a:r>
-          </a:p>
-          <a:p>
-            <a:r>
-              <a:rPr lang="en-US" dirty="0">
-                <a:latin typeface="Biome" panose="020B0503030204020804" pitchFamily="34" charset="0"/>
-                <a:cs typeface="Biome" panose="020B0503030204020804" pitchFamily="34" charset="0"/>
+              <a:t>(:Artists)-[:ARTIST_MADE_ALBUM]-(:Album)</a:t>
+            </a:r>
+          </a:p>
+        </p:txBody>
+      </p:sp>
+      <p:sp>
+        <p:nvSpPr>
+          <p:cNvPr id="9" name="TextBox 8">
+            <a:extLst>
+              <a:ext uri="{FF2B5EF4-FFF2-40B4-BE49-F238E27FC236}">
+                <a16:creationId xmlns:a16="http://schemas.microsoft.com/office/drawing/2014/main" id="{E2AB0D8A-7686-79FC-72BE-F127566D25F2}"/>
+              </a:ext>
+            </a:extLst>
+          </p:cNvPr>
+          <p:cNvSpPr txBox="1"/>
+          <p:nvPr/>
+        </p:nvSpPr>
+        <p:spPr>
+          <a:xfrm>
+            <a:off x="8787384" y="1953248"/>
+            <a:ext cx="3569208" cy="923330"/>
+          </a:xfrm>
+          <a:prstGeom prst="rect">
+            <a:avLst/>
+          </a:prstGeom>
+          <a:noFill/>
+        </p:spPr>
+        <p:txBody>
+          <a:bodyPr wrap="square" lIns="91440" tIns="45720" rIns="91440" bIns="45720" rtlCol="0" anchor="t">
+            <a:spAutoFit/>
+          </a:bodyPr>
+          <a:lstStyle/>
+          <a:p>
+            <a:r>
+              <a:rPr lang="en-US">
+                <a:latin typeface="Biome"/>
+                <a:cs typeface="Biome"/>
               </a:rPr>
-              <a:t>Git for version control, GitHub to store repository</a:t>
-            </a:r>
-          </a:p>
-          <a:p>
-            <a:r>
-              <a:rPr lang="en-US" dirty="0">
-                <a:latin typeface="Biome" panose="020B0503030204020804" pitchFamily="34" charset="0"/>
-                <a:cs typeface="Biome" panose="020B0503030204020804" pitchFamily="34" charset="0"/>
-              </a:rPr>
-              <a:t>Visual Studio Code as the IDE</a:t>
+              <a:t>(:Album)-[:ALBUM_HAS_TRACK]-(:Songs)</a:t>
             </a:r>
           </a:p>
         </p:txBody>
@@ -5123,7 +6274,7 @@
     </p:spTree>
     <p:extLst>
       <p:ext uri="{BB962C8B-B14F-4D97-AF65-F5344CB8AC3E}">
-        <p14:creationId xmlns:p14="http://schemas.microsoft.com/office/powerpoint/2010/main" val="178626268"/>
+        <p14:creationId xmlns:p14="http://schemas.microsoft.com/office/powerpoint/2010/main" val="2450130467"/>
       </p:ext>
     </p:extLst>
   </p:cSld>
@@ -5172,17 +6323,12 @@
           <a:lstStyle/>
           <a:p>
             <a:r>
-              <a:rPr lang="en-US" b="0" i="0" dirty="0">
-                <a:effectLst/>
+              <a:rPr lang="en-US" dirty="0">
                 <a:latin typeface="Biome" panose="020B0503030204020804" pitchFamily="34" charset="0"/>
                 <a:cs typeface="Biome" panose="020B0503030204020804" pitchFamily="34" charset="0"/>
               </a:rPr>
-              <a:t>Features</a:t>
-            </a:r>
-            <a:endParaRPr lang="en-US" dirty="0">
-              <a:latin typeface="Biome" panose="020B0503030204020804" pitchFamily="34" charset="0"/>
-              <a:cs typeface="Biome" panose="020B0503030204020804" pitchFamily="34" charset="0"/>
-            </a:endParaRPr>
+              <a:t>Tools USED</a:t>
+            </a:r>
           </a:p>
         </p:txBody>
       </p:sp>
@@ -5212,16 +6358,162 @@
                 <a:latin typeface="Biome" panose="020B0503030204020804" pitchFamily="34" charset="0"/>
                 <a:cs typeface="Biome" panose="020B0503030204020804" pitchFamily="34" charset="0"/>
               </a:rPr>
-              <a:t>Explain the features designed and implemented</a:t>
-            </a:r>
-            <a:endParaRPr lang="en-US" dirty="0"/>
-          </a:p>
-        </p:txBody>
-      </p:sp>
+              <a:t>Python as the programming language</a:t>
+            </a:r>
+          </a:p>
+          <a:p>
+            <a:r>
+              <a:rPr lang="en-US" dirty="0">
+                <a:latin typeface="Biome" panose="020B0503030204020804" pitchFamily="34" charset="0"/>
+                <a:cs typeface="Biome" panose="020B0503030204020804" pitchFamily="34" charset="0"/>
+              </a:rPr>
+              <a:t>Flask for the WEB framework</a:t>
+            </a:r>
+          </a:p>
+          <a:p>
+            <a:r>
+              <a:rPr lang="en-US" dirty="0">
+                <a:latin typeface="Biome" panose="020B0503030204020804" pitchFamily="34" charset="0"/>
+                <a:cs typeface="Biome" panose="020B0503030204020804" pitchFamily="34" charset="0"/>
+              </a:rPr>
+              <a:t>Git for version control, GitHub to store repository</a:t>
+            </a:r>
+          </a:p>
+          <a:p>
+            <a:r>
+              <a:rPr lang="en-US" dirty="0">
+                <a:latin typeface="Biome" panose="020B0503030204020804" pitchFamily="34" charset="0"/>
+                <a:cs typeface="Biome" panose="020B0503030204020804" pitchFamily="34" charset="0"/>
+              </a:rPr>
+              <a:t>Visual Studio Code as the IDE</a:t>
+            </a:r>
+          </a:p>
+        </p:txBody>
+      </p:sp>
+      <p:pic>
+        <p:nvPicPr>
+          <p:cNvPr id="4" name="Picture 3" descr="A blue logo with a black background&#10;&#10;Description automatically generated">
+            <a:extLst>
+              <a:ext uri="{FF2B5EF4-FFF2-40B4-BE49-F238E27FC236}">
+                <a16:creationId xmlns:a16="http://schemas.microsoft.com/office/drawing/2014/main" id="{072C8C29-35F6-EA6E-E583-35CE98294202}"/>
+              </a:ext>
+            </a:extLst>
+          </p:cNvPr>
+          <p:cNvPicPr>
+            <a:picLocks noChangeAspect="1"/>
+          </p:cNvPicPr>
+          <p:nvPr/>
+        </p:nvPicPr>
+        <p:blipFill>
+          <a:blip r:embed="rId2"/>
+          <a:stretch>
+            <a:fillRect/>
+          </a:stretch>
+        </p:blipFill>
+        <p:spPr>
+          <a:xfrm>
+            <a:off x="9698919" y="4207932"/>
+            <a:ext cx="1356079" cy="1341968"/>
+          </a:xfrm>
+          <a:prstGeom prst="rect">
+            <a:avLst/>
+          </a:prstGeom>
+        </p:spPr>
+      </p:pic>
+      <p:pic>
+        <p:nvPicPr>
+          <p:cNvPr id="5" name="Picture 4" descr="A close up of a logo&#10;&#10;Description automatically generated">
+            <a:extLst>
+              <a:ext uri="{FF2B5EF4-FFF2-40B4-BE49-F238E27FC236}">
+                <a16:creationId xmlns:a16="http://schemas.microsoft.com/office/drawing/2014/main" id="{3CFBBCB7-B579-2944-72B2-CC25635A9A00}"/>
+              </a:ext>
+            </a:extLst>
+          </p:cNvPr>
+          <p:cNvPicPr>
+            <a:picLocks noChangeAspect="1"/>
+          </p:cNvPicPr>
+          <p:nvPr/>
+        </p:nvPicPr>
+        <p:blipFill>
+          <a:blip r:embed="rId3"/>
+          <a:stretch>
+            <a:fillRect/>
+          </a:stretch>
+        </p:blipFill>
+        <p:spPr>
+          <a:xfrm>
+            <a:off x="6665735" y="4451279"/>
+            <a:ext cx="2060223" cy="858803"/>
+          </a:xfrm>
+          <a:prstGeom prst="rect">
+            <a:avLst/>
+          </a:prstGeom>
+        </p:spPr>
+      </p:pic>
+      <p:pic>
+        <p:nvPicPr>
+          <p:cNvPr id="6" name="Picture 5">
+            <a:extLst>
+              <a:ext uri="{FF2B5EF4-FFF2-40B4-BE49-F238E27FC236}">
+                <a16:creationId xmlns:a16="http://schemas.microsoft.com/office/drawing/2014/main" id="{477E8A08-245E-1C44-2D93-044B5D886CF1}"/>
+              </a:ext>
+            </a:extLst>
+          </p:cNvPr>
+          <p:cNvPicPr>
+            <a:picLocks noChangeAspect="1"/>
+          </p:cNvPicPr>
+          <p:nvPr/>
+        </p:nvPicPr>
+        <p:blipFill>
+          <a:blip r:embed="rId4"/>
+          <a:stretch>
+            <a:fillRect/>
+          </a:stretch>
+        </p:blipFill>
+        <p:spPr>
+          <a:xfrm>
+            <a:off x="3848806" y="4494741"/>
+            <a:ext cx="1961445" cy="771878"/>
+          </a:xfrm>
+          <a:prstGeom prst="rect">
+            <a:avLst/>
+          </a:prstGeom>
+        </p:spPr>
+      </p:pic>
+      <p:pic>
+        <p:nvPicPr>
+          <p:cNvPr id="7" name="Picture 6" descr="A blue and yellow snake logo&#10;&#10;Description automatically generated">
+            <a:extLst>
+              <a:ext uri="{FF2B5EF4-FFF2-40B4-BE49-F238E27FC236}">
+                <a16:creationId xmlns:a16="http://schemas.microsoft.com/office/drawing/2014/main" id="{6865744C-AD19-04A4-C7B1-C64831F6F550}"/>
+              </a:ext>
+            </a:extLst>
+          </p:cNvPr>
+          <p:cNvPicPr>
+            <a:picLocks noChangeAspect="1"/>
+          </p:cNvPicPr>
+          <p:nvPr/>
+        </p:nvPicPr>
+        <p:blipFill>
+          <a:blip r:embed="rId5"/>
+          <a:stretch>
+            <a:fillRect/>
+          </a:stretch>
+        </p:blipFill>
+        <p:spPr>
+          <a:xfrm>
+            <a:off x="2218988" y="4347280"/>
+            <a:ext cx="980690" cy="1073857"/>
+          </a:xfrm>
+          <a:prstGeom prst="rect">
+            <a:avLst/>
+          </a:prstGeom>
+        </p:spPr>
+      </p:pic>
     </p:spTree>
     <p:extLst>
       <p:ext uri="{BB962C8B-B14F-4D97-AF65-F5344CB8AC3E}">
-        <p14:creationId xmlns:p14="http://schemas.microsoft.com/office/powerpoint/2010/main" val="1579072734"/>
+        <p14:creationId xmlns:p14="http://schemas.microsoft.com/office/powerpoint/2010/main" val="1259246595"/>
       </p:ext>
     </p:extLst>
   </p:cSld>
@@ -5275,7 +6567,7 @@
                 <a:latin typeface="Biome" panose="020B0503030204020804" pitchFamily="34" charset="0"/>
                 <a:cs typeface="Biome" panose="020B0503030204020804" pitchFamily="34" charset="0"/>
               </a:rPr>
-              <a:t>Queries</a:t>
+              <a:t>Features</a:t>
             </a:r>
             <a:endParaRPr lang="en-US" dirty="0">
               <a:latin typeface="Biome" panose="020B0503030204020804" pitchFamily="34" charset="0"/>
@@ -5300,26 +6592,83 @@
             <p:ph idx="1"/>
           </p:nvPr>
         </p:nvSpPr>
-        <p:spPr/>
+        <p:spPr>
+          <a:xfrm>
+            <a:off x="1451579" y="2255620"/>
+            <a:ext cx="4868998" cy="3210725"/>
+          </a:xfrm>
+        </p:spPr>
         <p:txBody>
           <a:bodyPr/>
           <a:lstStyle/>
           <a:p>
             <a:r>
               <a:rPr lang="en-US" dirty="0">
-                <a:latin typeface="Biome" panose="020B0503030204020804" pitchFamily="34" charset="0"/>
-                <a:cs typeface="Biome" panose="020B0503030204020804" pitchFamily="34" charset="0"/>
+                <a:latin typeface="Biome"/>
+                <a:cs typeface="Biome"/>
               </a:rPr>
-              <a:t>Explain the features designed and implemented</a:t>
-            </a:r>
-            <a:endParaRPr lang="en-US" dirty="0"/>
-          </a:p>
-        </p:txBody>
-      </p:sp>
+              <a:t>Search different songs from dataset of 114,000 entries</a:t>
+            </a:r>
+          </a:p>
+          <a:p>
+            <a:r>
+              <a:rPr lang="en-US" dirty="0">
+                <a:latin typeface="Biome"/>
+                <a:cs typeface="Biome"/>
+              </a:rPr>
+              <a:t>Recommend new songs in a variety of different way using different kinds of data</a:t>
+            </a:r>
+          </a:p>
+          <a:p>
+            <a:r>
+              <a:rPr lang="en-US" dirty="0">
+                <a:latin typeface="Biome"/>
+                <a:cs typeface="Biome"/>
+              </a:rPr>
+              <a:t>Get info on any specific song from dataset</a:t>
+            </a:r>
+          </a:p>
+          <a:p>
+            <a:endParaRPr lang="en-US" dirty="0">
+              <a:latin typeface="Biome"/>
+              <a:cs typeface="Biome"/>
+            </a:endParaRPr>
+          </a:p>
+        </p:txBody>
+      </p:sp>
+      <p:pic>
+        <p:nvPicPr>
+          <p:cNvPr id="7" name="Picture 6">
+            <a:extLst>
+              <a:ext uri="{FF2B5EF4-FFF2-40B4-BE49-F238E27FC236}">
+                <a16:creationId xmlns:a16="http://schemas.microsoft.com/office/drawing/2014/main" id="{7BAFDE78-36E4-CB26-7C44-529EE8C673E1}"/>
+              </a:ext>
+            </a:extLst>
+          </p:cNvPr>
+          <p:cNvPicPr>
+            <a:picLocks noChangeAspect="1"/>
+          </p:cNvPicPr>
+          <p:nvPr/>
+        </p:nvPicPr>
+        <p:blipFill rotWithShape="1">
+          <a:blip r:embed="rId3"/>
+          <a:srcRect r="8254"/>
+          <a:stretch/>
+        </p:blipFill>
+        <p:spPr>
+          <a:xfrm>
+            <a:off x="6699282" y="2394041"/>
+            <a:ext cx="5014182" cy="2693994"/>
+          </a:xfrm>
+          <a:prstGeom prst="rect">
+            <a:avLst/>
+          </a:prstGeom>
+        </p:spPr>
+      </p:pic>
     </p:spTree>
     <p:extLst>
       <p:ext uri="{BB962C8B-B14F-4D97-AF65-F5344CB8AC3E}">
-        <p14:creationId xmlns:p14="http://schemas.microsoft.com/office/powerpoint/2010/main" val="591788664"/>
+        <p14:creationId xmlns:p14="http://schemas.microsoft.com/office/powerpoint/2010/main" val="1579072734"/>
       </p:ext>
     </p:extLst>
   </p:cSld>
@@ -5580,4 +6929,299 @@
     </a:ext>
   </a:extLst>
 </a:theme>
+</file>
+
+<file path=ppt/theme/theme2.xml><?xml version="1.0" encoding="utf-8"?>
+<a:theme xmlns:a="http://schemas.openxmlformats.org/drawingml/2006/main" name="Office Theme">
+  <a:themeElements>
+    <a:clrScheme name="Office">
+      <a:dk1>
+        <a:sysClr val="windowText" lastClr="000000"/>
+      </a:dk1>
+      <a:lt1>
+        <a:sysClr val="window" lastClr="FFFFFF"/>
+      </a:lt1>
+      <a:dk2>
+        <a:srgbClr val="44546A"/>
+      </a:dk2>
+      <a:lt2>
+        <a:srgbClr val="E7E6E6"/>
+      </a:lt2>
+      <a:accent1>
+        <a:srgbClr val="4472C4"/>
+      </a:accent1>
+      <a:accent2>
+        <a:srgbClr val="ED7D31"/>
+      </a:accent2>
+      <a:accent3>
+        <a:srgbClr val="A5A5A5"/>
+      </a:accent3>
+      <a:accent4>
+        <a:srgbClr val="FFC000"/>
+      </a:accent4>
+      <a:accent5>
+        <a:srgbClr val="5B9BD5"/>
+      </a:accent5>
+      <a:accent6>
+        <a:srgbClr val="70AD47"/>
+      </a:accent6>
+      <a:hlink>
+        <a:srgbClr val="0563C1"/>
+      </a:hlink>
+      <a:folHlink>
+        <a:srgbClr val="954F72"/>
+      </a:folHlink>
+    </a:clrScheme>
+    <a:fontScheme name="Office">
+      <a:majorFont>
+        <a:latin typeface="Calibri Light" panose="020F0302020204030204"/>
+        <a:ea typeface=""/>
+        <a:cs typeface=""/>
+        <a:font script="Jpan" typeface="游ゴシック Light"/>
+        <a:font script="Hang" typeface="맑은 고딕"/>
+        <a:font script="Hans" typeface="等线 Light"/>
+        <a:font script="Hant" typeface="新細明體"/>
+        <a:font script="Arab" typeface="Times New Roman"/>
+        <a:font script="Hebr" typeface="Times New Roman"/>
+        <a:font script="Thai" typeface="Angsana New"/>
+        <a:font script="Ethi" typeface="Nyala"/>
+        <a:font script="Beng" typeface="Vrinda"/>
+        <a:font script="Gujr" typeface="Shruti"/>
+        <a:font script="Khmr" typeface="MoolBoran"/>
+        <a:font script="Knda" typeface="Tunga"/>
+        <a:font script="Guru" typeface="Raavi"/>
+        <a:font script="Cans" typeface="Euphemia"/>
+        <a:font script="Cher" typeface="Plantagenet Cherokee"/>
+        <a:font script="Yiii" typeface="Microsoft Yi Baiti"/>
+        <a:font script="Tibt" typeface="Microsoft Himalaya"/>
+        <a:font script="Thaa" typeface="MV Boli"/>
+        <a:font script="Deva" typeface="Mangal"/>
+        <a:font script="Telu" typeface="Gautami"/>
+        <a:font script="Taml" typeface="Latha"/>
+        <a:font script="Syrc" typeface="Estrangelo Edessa"/>
+        <a:font script="Orya" typeface="Kalinga"/>
+        <a:font script="Mlym" typeface="Kartika"/>
+        <a:font script="Laoo" typeface="DokChampa"/>
+        <a:font script="Sinh" typeface="Iskoola Pota"/>
+        <a:font script="Mong" typeface="Mongolian Baiti"/>
+        <a:font script="Viet" typeface="Times New Roman"/>
+        <a:font script="Uigh" typeface="Microsoft Uighur"/>
+        <a:font script="Geor" typeface="Sylfaen"/>
+        <a:font script="Armn" typeface="Arial"/>
+        <a:font script="Bugi" typeface="Leelawadee UI"/>
+        <a:font script="Bopo" typeface="Microsoft JhengHei"/>
+        <a:font script="Java" typeface="Javanese Text"/>
+        <a:font script="Lisu" typeface="Segoe UI"/>
+        <a:font script="Mymr" typeface="Myanmar Text"/>
+        <a:font script="Nkoo" typeface="Ebrima"/>
+        <a:font script="Olck" typeface="Nirmala UI"/>
+        <a:font script="Osma" typeface="Ebrima"/>
+        <a:font script="Phag" typeface="Phagspa"/>
+        <a:font script="Syrn" typeface="Estrangelo Edessa"/>
+        <a:font script="Syrj" typeface="Estrangelo Edessa"/>
+        <a:font script="Syre" typeface="Estrangelo Edessa"/>
+        <a:font script="Sora" typeface="Nirmala UI"/>
+        <a:font script="Tale" typeface="Microsoft Tai Le"/>
+        <a:font script="Talu" typeface="Microsoft New Tai Lue"/>
+        <a:font script="Tfng" typeface="Ebrima"/>
+      </a:majorFont>
+      <a:minorFont>
+        <a:latin typeface="Calibri" panose="020F0502020204030204"/>
+        <a:ea typeface=""/>
+        <a:cs typeface=""/>
+        <a:font script="Jpan" typeface="游ゴシック"/>
+        <a:font script="Hang" typeface="맑은 고딕"/>
+        <a:font script="Hans" typeface="等线"/>
+        <a:font script="Hant" typeface="新細明體"/>
+        <a:font script="Arab" typeface="Arial"/>
+        <a:font script="Hebr" typeface="Arial"/>
+        <a:font script="Thai" typeface="Cordia New"/>
+        <a:font script="Ethi" typeface="Nyala"/>
+        <a:font script="Beng" typeface="Vrinda"/>
+        <a:font script="Gujr" typeface="Shruti"/>
+        <a:font script="Khmr" typeface="DaunPenh"/>
+        <a:font script="Knda" typeface="Tunga"/>
+        <a:font script="Guru" typeface="Raavi"/>
+        <a:font script="Cans" typeface="Euphemia"/>
+        <a:font script="Cher" typeface="Plantagenet Cherokee"/>
+        <a:font script="Yiii" typeface="Microsoft Yi Baiti"/>
+        <a:font script="Tibt" typeface="Microsoft Himalaya"/>
+        <a:font script="Thaa" typeface="MV Boli"/>
+        <a:font script="Deva" typeface="Mangal"/>
+        <a:font script="Telu" typeface="Gautami"/>
+        <a:font script="Taml" typeface="Latha"/>
+        <a:font script="Syrc" typeface="Estrangelo Edessa"/>
+        <a:font script="Orya" typeface="Kalinga"/>
+        <a:font script="Mlym" typeface="Kartika"/>
+        <a:font script="Laoo" typeface="DokChampa"/>
+        <a:font script="Sinh" typeface="Iskoola Pota"/>
+        <a:font script="Mong" typeface="Mongolian Baiti"/>
+        <a:font script="Viet" typeface="Arial"/>
+        <a:font script="Uigh" typeface="Microsoft Uighur"/>
+        <a:font script="Geor" typeface="Sylfaen"/>
+        <a:font script="Armn" typeface="Arial"/>
+        <a:font script="Bugi" typeface="Leelawadee UI"/>
+        <a:font script="Bopo" typeface="Microsoft JhengHei"/>
+        <a:font script="Java" typeface="Javanese Text"/>
+        <a:font script="Lisu" typeface="Segoe UI"/>
+        <a:font script="Mymr" typeface="Myanmar Text"/>
+        <a:font script="Nkoo" typeface="Ebrima"/>
+        <a:font script="Olck" typeface="Nirmala UI"/>
+        <a:font script="Osma" typeface="Ebrima"/>
+        <a:font script="Phag" typeface="Phagspa"/>
+        <a:font script="Syrn" typeface="Estrangelo Edessa"/>
+        <a:font script="Syrj" typeface="Estrangelo Edessa"/>
+        <a:font script="Syre" typeface="Estrangelo Edessa"/>
+        <a:font script="Sora" typeface="Nirmala UI"/>
+        <a:font script="Tale" typeface="Microsoft Tai Le"/>
+        <a:font script="Talu" typeface="Microsoft New Tai Lue"/>
+        <a:font script="Tfng" typeface="Ebrima"/>
+      </a:minorFont>
+    </a:fontScheme>
+    <a:fmtScheme name="Office">
+      <a:fillStyleLst>
+        <a:solidFill>
+          <a:schemeClr val="phClr"/>
+        </a:solidFill>
+        <a:gradFill rotWithShape="1">
+          <a:gsLst>
+            <a:gs pos="0">
+              <a:schemeClr val="phClr">
+                <a:lumMod val="110000"/>
+                <a:satMod val="105000"/>
+                <a:tint val="67000"/>
+              </a:schemeClr>
+            </a:gs>
+            <a:gs pos="50000">
+              <a:schemeClr val="phClr">
+                <a:lumMod val="105000"/>
+                <a:satMod val="103000"/>
+                <a:tint val="73000"/>
+              </a:schemeClr>
+            </a:gs>
+            <a:gs pos="100000">
+              <a:schemeClr val="phClr">
+                <a:lumMod val="105000"/>
+                <a:satMod val="109000"/>
+                <a:tint val="81000"/>
+              </a:schemeClr>
+            </a:gs>
+          </a:gsLst>
+          <a:lin ang="5400000" scaled="0"/>
+        </a:gradFill>
+        <a:gradFill rotWithShape="1">
+          <a:gsLst>
+            <a:gs pos="0">
+              <a:schemeClr val="phClr">
+                <a:satMod val="103000"/>
+                <a:lumMod val="102000"/>
+                <a:tint val="94000"/>
+              </a:schemeClr>
+            </a:gs>
+            <a:gs pos="50000">
+              <a:schemeClr val="phClr">
+                <a:satMod val="110000"/>
+                <a:lumMod val="100000"/>
+                <a:shade val="100000"/>
+              </a:schemeClr>
+            </a:gs>
+            <a:gs pos="100000">
+              <a:schemeClr val="phClr">
+                <a:lumMod val="99000"/>
+                <a:satMod val="120000"/>
+                <a:shade val="78000"/>
+              </a:schemeClr>
+            </a:gs>
+          </a:gsLst>
+          <a:lin ang="5400000" scaled="0"/>
+        </a:gradFill>
+      </a:fillStyleLst>
+      <a:lnStyleLst>
+        <a:ln w="6350" cap="flat" cmpd="sng" algn="ctr">
+          <a:solidFill>
+            <a:schemeClr val="phClr"/>
+          </a:solidFill>
+          <a:prstDash val="solid"/>
+          <a:miter lim="800000"/>
+        </a:ln>
+        <a:ln w="12700" cap="flat" cmpd="sng" algn="ctr">
+          <a:solidFill>
+            <a:schemeClr val="phClr"/>
+          </a:solidFill>
+          <a:prstDash val="solid"/>
+          <a:miter lim="800000"/>
+        </a:ln>
+        <a:ln w="19050" cap="flat" cmpd="sng" algn="ctr">
+          <a:solidFill>
+            <a:schemeClr val="phClr"/>
+          </a:solidFill>
+          <a:prstDash val="solid"/>
+          <a:miter lim="800000"/>
+        </a:ln>
+      </a:lnStyleLst>
+      <a:effectStyleLst>
+        <a:effectStyle>
+          <a:effectLst/>
+        </a:effectStyle>
+        <a:effectStyle>
+          <a:effectLst/>
+        </a:effectStyle>
+        <a:effectStyle>
+          <a:effectLst>
+            <a:outerShdw blurRad="57150" dist="19050" dir="5400000" algn="ctr" rotWithShape="0">
+              <a:srgbClr val="000000">
+                <a:alpha val="63000"/>
+              </a:srgbClr>
+            </a:outerShdw>
+          </a:effectLst>
+        </a:effectStyle>
+      </a:effectStyleLst>
+      <a:bgFillStyleLst>
+        <a:solidFill>
+          <a:schemeClr val="phClr"/>
+        </a:solidFill>
+        <a:solidFill>
+          <a:schemeClr val="phClr">
+            <a:tint val="95000"/>
+            <a:satMod val="170000"/>
+          </a:schemeClr>
+        </a:solidFill>
+        <a:gradFill rotWithShape="1">
+          <a:gsLst>
+            <a:gs pos="0">
+              <a:schemeClr val="phClr">
+                <a:tint val="93000"/>
+                <a:satMod val="150000"/>
+                <a:shade val="98000"/>
+                <a:lumMod val="102000"/>
+              </a:schemeClr>
+            </a:gs>
+            <a:gs pos="50000">
+              <a:schemeClr val="phClr">
+                <a:tint val="98000"/>
+                <a:satMod val="130000"/>
+                <a:shade val="90000"/>
+                <a:lumMod val="103000"/>
+              </a:schemeClr>
+            </a:gs>
+            <a:gs pos="100000">
+              <a:schemeClr val="phClr">
+                <a:shade val="63000"/>
+                <a:satMod val="120000"/>
+              </a:schemeClr>
+            </a:gs>
+          </a:gsLst>
+          <a:lin ang="5400000" scaled="0"/>
+        </a:gradFill>
+      </a:bgFillStyleLst>
+    </a:fmtScheme>
+  </a:themeElements>
+  <a:objectDefaults/>
+  <a:extraClrSchemeLst/>
+  <a:extLst>
+    <a:ext uri="{05A4C25C-085E-4340-85A3-A5531E510DB2}">
+      <thm15:themeFamily xmlns:thm15="http://schemas.microsoft.com/office/thememl/2012/main" name="Office Theme" id="{62F939B6-93AF-4DB8-9C6B-D6C7DFDC589F}" vid="{4A3C46E8-61CC-4603-A589-7422A47A8E4A}"/>
+    </a:ext>
+  </a:extLst>
+</a:theme>
 </file>
</xml_diff>